<commit_message>
New template applied - RJH
</commit_message>
<xml_diff>
--- a/slides/KeyStone C66x CorePac.pptx
+++ b/slides/KeyStone C66x CorePac.pptx
@@ -8,12 +8,12 @@
     <p:notesMasterId r:id="rId40"/>
   </p:notesMasterIdLst>
   <p:sldIdLst>
-    <p:sldId id="294" r:id="rId2"/>
+    <p:sldId id="330" r:id="rId2"/>
     <p:sldId id="329" r:id="rId3"/>
-    <p:sldId id="295" r:id="rId4"/>
+    <p:sldId id="331" r:id="rId4"/>
     <p:sldId id="298" r:id="rId5"/>
     <p:sldId id="299" r:id="rId6"/>
-    <p:sldId id="302" r:id="rId7"/>
+    <p:sldId id="332" r:id="rId7"/>
     <p:sldId id="268" r:id="rId8"/>
     <p:sldId id="269" r:id="rId9"/>
     <p:sldId id="260" r:id="rId10"/>
@@ -23,27 +23,27 @@
     <p:sldId id="303" r:id="rId14"/>
     <p:sldId id="304" r:id="rId15"/>
     <p:sldId id="305" r:id="rId16"/>
-    <p:sldId id="306" r:id="rId17"/>
+    <p:sldId id="333" r:id="rId17"/>
     <p:sldId id="265" r:id="rId18"/>
     <p:sldId id="266" r:id="rId19"/>
     <p:sldId id="267" r:id="rId20"/>
-    <p:sldId id="307" r:id="rId21"/>
+    <p:sldId id="334" r:id="rId21"/>
     <p:sldId id="264" r:id="rId22"/>
     <p:sldId id="313" r:id="rId23"/>
     <p:sldId id="314" r:id="rId24"/>
     <p:sldId id="315" r:id="rId25"/>
-    <p:sldId id="308" r:id="rId26"/>
+    <p:sldId id="335" r:id="rId26"/>
     <p:sldId id="310" r:id="rId27"/>
-    <p:sldId id="311" r:id="rId28"/>
+    <p:sldId id="336" r:id="rId28"/>
     <p:sldId id="317" r:id="rId29"/>
     <p:sldId id="316" r:id="rId30"/>
-    <p:sldId id="318" r:id="rId31"/>
+    <p:sldId id="337" r:id="rId31"/>
     <p:sldId id="322" r:id="rId32"/>
     <p:sldId id="320" r:id="rId33"/>
     <p:sldId id="328" r:id="rId34"/>
-    <p:sldId id="323" r:id="rId35"/>
+    <p:sldId id="338" r:id="rId35"/>
     <p:sldId id="325" r:id="rId36"/>
-    <p:sldId id="326" r:id="rId37"/>
+    <p:sldId id="339" r:id="rId37"/>
     <p:sldId id="327" r:id="rId38"/>
     <p:sldId id="293" r:id="rId39"/>
   </p:sldIdLst>
@@ -287,7 +287,7 @@
               <a:pPr>
                 <a:defRPr/>
               </a:pPr>
-              <a:t>3/11/2013</a:t>
+              <a:t>9/25/2013</a:t>
             </a:fld>
             <a:endParaRPr lang="en-US" dirty="0"/>
           </a:p>
@@ -1505,6 +1505,42 @@
           </a:p>
         </p:txBody>
       </p:sp>
+      <p:sp>
+        <p:nvSpPr>
+          <p:cNvPr id="4" name="Rectangle 24"/>
+          <p:cNvSpPr>
+            <a:spLocks noGrp="1" noChangeArrowheads="1"/>
+          </p:cNvSpPr>
+          <p:nvPr>
+            <p:ph type="sldNum" sz="quarter" idx="4"/>
+          </p:nvPr>
+        </p:nvSpPr>
+        <p:spPr>
+          <a:xfrm>
+            <a:off x="6642100" y="6038850"/>
+            <a:ext cx="2133600" cy="206375"/>
+          </a:xfrm>
+          <a:prstGeom prst="rect">
+            <a:avLst/>
+          </a:prstGeom>
+        </p:spPr>
+        <p:txBody>
+          <a:bodyPr/>
+          <a:lstStyle>
+            <a:lvl1pPr algn="r">
+              <a:defRPr sz="800"/>
+            </a:lvl1pPr>
+          </a:lstStyle>
+          <a:p>
+            <a:fld id="{F2394529-A9B3-4A54-83EC-E61379E8334E}" type="slidenum">
+              <a:rPr lang="en-US" smtClean="0"/>
+              <a:pPr/>
+              <a:t>‹#›</a:t>
+            </a:fld>
+            <a:endParaRPr lang="en-US" dirty="0"/>
+          </a:p>
+        </p:txBody>
+      </p:sp>
     </p:spTree>
   </p:cSld>
   <p:clrMapOvr>
@@ -1514,8 +1550,280 @@
 </file>
 
 <file path=ppt/slideLayouts/slideLayout2.xml><?xml version="1.0" encoding="utf-8"?>
-<p:sldLayout xmlns:a="http://schemas.openxmlformats.org/drawingml/2006/main" xmlns:r="http://schemas.openxmlformats.org/officeDocument/2006/relationships" xmlns:p="http://schemas.openxmlformats.org/presentationml/2006/main" type="title">
+<p:sldLayout xmlns:a="http://schemas.openxmlformats.org/drawingml/2006/main" xmlns:r="http://schemas.openxmlformats.org/officeDocument/2006/relationships" xmlns:p="http://schemas.openxmlformats.org/presentationml/2006/main" userDrawn="1">
   <p:cSld name="Title Slide">
+    <p:spTree>
+      <p:nvGrpSpPr>
+        <p:cNvPr id="1" name=""/>
+        <p:cNvGrpSpPr/>
+        <p:nvPr/>
+      </p:nvGrpSpPr>
+      <p:grpSpPr>
+        <a:xfrm>
+          <a:off x="0" y="0"/>
+          <a:ext cx="0" cy="0"/>
+          <a:chOff x="0" y="0"/>
+          <a:chExt cx="0" cy="0"/>
+        </a:xfrm>
+      </p:grpSpPr>
+      <p:pic>
+        <p:nvPicPr>
+          <p:cNvPr id="4" name="Picture 3" descr="selected_powerpoint_bg_1.jpg"/>
+          <p:cNvPicPr>
+            <a:picLocks noChangeAspect="1"/>
+          </p:cNvPicPr>
+          <p:nvPr userDrawn="1"/>
+        </p:nvPicPr>
+        <p:blipFill>
+          <a:blip r:embed="rId2" cstate="print"/>
+          <a:srcRect/>
+          <a:stretch>
+            <a:fillRect/>
+          </a:stretch>
+        </p:blipFill>
+        <p:spPr bwMode="auto">
+          <a:xfrm>
+            <a:off x="0" y="0"/>
+            <a:ext cx="9144000" cy="6858000"/>
+          </a:xfrm>
+          <a:prstGeom prst="rect">
+            <a:avLst/>
+          </a:prstGeom>
+          <a:noFill/>
+          <a:ln w="9525">
+            <a:noFill/>
+            <a:miter lim="800000"/>
+            <a:headEnd/>
+            <a:tailEnd/>
+          </a:ln>
+        </p:spPr>
+      </p:pic>
+      <p:sp>
+        <p:nvSpPr>
+          <p:cNvPr id="5" name="Rectangle 2"/>
+          <p:cNvSpPr>
+            <a:spLocks noGrp="1" noChangeArrowheads="1"/>
+          </p:cNvSpPr>
+          <p:nvPr>
+            <p:ph type="ctrTitle"/>
+          </p:nvPr>
+        </p:nvSpPr>
+        <p:spPr>
+          <a:xfrm>
+            <a:off x="342900" y="1943100"/>
+            <a:ext cx="8458200" cy="1470025"/>
+          </a:xfrm>
+        </p:spPr>
+        <p:txBody>
+          <a:bodyPr/>
+          <a:lstStyle>
+            <a:lvl1pPr algn="l">
+              <a:defRPr sz="4000">
+                <a:solidFill>
+                  <a:srgbClr val="DE0000"/>
+                </a:solidFill>
+              </a:defRPr>
+            </a:lvl1pPr>
+          </a:lstStyle>
+          <a:p>
+            <a:r>
+              <a:rPr lang="en-US" dirty="0"/>
+              <a:t>Click to edit Master title style</a:t>
+            </a:r>
+          </a:p>
+        </p:txBody>
+      </p:sp>
+      <p:sp>
+        <p:nvSpPr>
+          <p:cNvPr id="6" name="Rectangle 3"/>
+          <p:cNvSpPr>
+            <a:spLocks noGrp="1" noChangeArrowheads="1"/>
+          </p:cNvSpPr>
+          <p:nvPr>
+            <p:ph type="subTitle" idx="1"/>
+          </p:nvPr>
+        </p:nvSpPr>
+        <p:spPr>
+          <a:xfrm>
+            <a:off x="342900" y="3698875"/>
+            <a:ext cx="8458200" cy="1485900"/>
+          </a:xfrm>
+          <a:ln/>
+        </p:spPr>
+        <p:txBody>
+          <a:bodyPr/>
+          <a:lstStyle>
+            <a:lvl1pPr marL="0" indent="0">
+              <a:buFontTx/>
+              <a:buNone/>
+              <a:defRPr sz="2000" b="1">
+                <a:latin typeface="Calibri" pitchFamily="34" charset="0"/>
+                <a:cs typeface="Calibri" pitchFamily="34" charset="0"/>
+              </a:defRPr>
+            </a:lvl1pPr>
+          </a:lstStyle>
+          <a:p>
+            <a:r>
+              <a:rPr lang="en-US" dirty="0"/>
+              <a:t>Click to edit Master subtitle style</a:t>
+            </a:r>
+          </a:p>
+        </p:txBody>
+      </p:sp>
+    </p:spTree>
+  </p:cSld>
+  <p:clrMapOvr>
+    <a:masterClrMapping/>
+  </p:clrMapOvr>
+  <p:transition spd="med">
+    <p:fade/>
+  </p:transition>
+</p:sldLayout>
+</file>
+
+<file path=ppt/slideLayouts/slideLayout3.xml><?xml version="1.0" encoding="utf-8"?>
+<p:sldLayout xmlns:a="http://schemas.openxmlformats.org/drawingml/2006/main" xmlns:r="http://schemas.openxmlformats.org/officeDocument/2006/relationships" xmlns:p="http://schemas.openxmlformats.org/presentationml/2006/main" preserve="1" userDrawn="1">
+  <p:cSld name="1_Title Slide">
+    <p:spTree>
+      <p:nvGrpSpPr>
+        <p:cNvPr id="1" name=""/>
+        <p:cNvGrpSpPr/>
+        <p:nvPr/>
+      </p:nvGrpSpPr>
+      <p:grpSpPr>
+        <a:xfrm>
+          <a:off x="0" y="0"/>
+          <a:ext cx="0" cy="0"/>
+          <a:chOff x="0" y="0"/>
+          <a:chExt cx="0" cy="0"/>
+        </a:xfrm>
+      </p:grpSpPr>
+      <p:pic>
+        <p:nvPicPr>
+          <p:cNvPr id="7" name="Picture 6" descr="selected_powerpoint_bg_1_grey.jpg"/>
+          <p:cNvPicPr>
+            <a:picLocks noChangeAspect="1"/>
+          </p:cNvPicPr>
+          <p:nvPr userDrawn="1"/>
+        </p:nvPicPr>
+        <p:blipFill>
+          <a:blip r:embed="rId2" cstate="print"/>
+          <a:srcRect/>
+          <a:stretch>
+            <a:fillRect/>
+          </a:stretch>
+        </p:blipFill>
+        <p:spPr bwMode="auto">
+          <a:xfrm>
+            <a:off x="0" y="0"/>
+            <a:ext cx="9144000" cy="6858000"/>
+          </a:xfrm>
+          <a:prstGeom prst="rect">
+            <a:avLst/>
+          </a:prstGeom>
+          <a:noFill/>
+          <a:ln w="9525">
+            <a:noFill/>
+            <a:miter lim="800000"/>
+            <a:headEnd/>
+            <a:tailEnd/>
+          </a:ln>
+        </p:spPr>
+      </p:pic>
+      <p:sp>
+        <p:nvSpPr>
+          <p:cNvPr id="5" name="Rectangle 2"/>
+          <p:cNvSpPr>
+            <a:spLocks noGrp="1" noChangeArrowheads="1"/>
+          </p:cNvSpPr>
+          <p:nvPr>
+            <p:ph type="ctrTitle" hasCustomPrompt="1"/>
+          </p:nvPr>
+        </p:nvSpPr>
+        <p:spPr>
+          <a:xfrm>
+            <a:off x="342900" y="1943100"/>
+            <a:ext cx="8458200" cy="1470025"/>
+          </a:xfrm>
+        </p:spPr>
+        <p:txBody>
+          <a:bodyPr/>
+          <a:lstStyle>
+            <a:lvl1pPr algn="l">
+              <a:defRPr sz="4000">
+                <a:solidFill>
+                  <a:srgbClr val="DE0000"/>
+                </a:solidFill>
+              </a:defRPr>
+            </a:lvl1pPr>
+          </a:lstStyle>
+          <a:p>
+            <a:r>
+              <a:rPr lang="en-US" dirty="0"/>
+              <a:t>Click to edit Master </a:t>
+            </a:r>
+            <a:r>
+              <a:rPr lang="en-US" dirty="0" smtClean="0"/>
+              <a:t>section </a:t>
+            </a:r>
+            <a:r>
+              <a:rPr lang="en-US" dirty="0"/>
+              <a:t>style</a:t>
+            </a:r>
+          </a:p>
+        </p:txBody>
+      </p:sp>
+      <p:sp>
+        <p:nvSpPr>
+          <p:cNvPr id="6" name="Rectangle 3"/>
+          <p:cNvSpPr>
+            <a:spLocks noGrp="1" noChangeArrowheads="1"/>
+          </p:cNvSpPr>
+          <p:nvPr>
+            <p:ph type="subTitle" idx="1"/>
+          </p:nvPr>
+        </p:nvSpPr>
+        <p:spPr>
+          <a:xfrm>
+            <a:off x="342900" y="3698875"/>
+            <a:ext cx="8458200" cy="1485900"/>
+          </a:xfrm>
+          <a:ln/>
+        </p:spPr>
+        <p:txBody>
+          <a:bodyPr/>
+          <a:lstStyle>
+            <a:lvl1pPr marL="0" indent="0">
+              <a:buFontTx/>
+              <a:buNone/>
+              <a:defRPr sz="2000" b="1">
+                <a:latin typeface="Calibri" pitchFamily="34" charset="0"/>
+                <a:cs typeface="Calibri" pitchFamily="34" charset="0"/>
+              </a:defRPr>
+            </a:lvl1pPr>
+          </a:lstStyle>
+          <a:p>
+            <a:r>
+              <a:rPr lang="en-US" dirty="0"/>
+              <a:t>Click to edit Master subtitle style</a:t>
+            </a:r>
+          </a:p>
+        </p:txBody>
+      </p:sp>
+    </p:spTree>
+  </p:cSld>
+  <p:clrMapOvr>
+    <a:masterClrMapping/>
+  </p:clrMapOvr>
+  <p:transition spd="med">
+    <p:fade/>
+  </p:transition>
+</p:sldLayout>
+</file>
+
+<file path=ppt/slideLayouts/slideLayout4.xml><?xml version="1.0" encoding="utf-8"?>
+<p:sldLayout xmlns:a="http://schemas.openxmlformats.org/drawingml/2006/main" xmlns:r="http://schemas.openxmlformats.org/officeDocument/2006/relationships" xmlns:p="http://schemas.openxmlformats.org/presentationml/2006/main" type="blank">
+  <p:cSld name="Blank">
     <p:spTree>
       <p:nvGrpSpPr>
         <p:cNvPr id="1" name=""/>
@@ -1532,94 +1840,37 @@
       </p:grpSpPr>
       <p:sp>
         <p:nvSpPr>
-          <p:cNvPr id="2" name="Title 1"/>
+          <p:cNvPr id="2" name="Rectangle 24"/>
           <p:cNvSpPr>
-            <a:spLocks noGrp="1"/>
+            <a:spLocks noGrp="1" noChangeArrowheads="1"/>
           </p:cNvSpPr>
           <p:nvPr>
-            <p:ph type="ctrTitle"/>
+            <p:ph type="sldNum" sz="quarter" idx="4"/>
           </p:nvPr>
         </p:nvSpPr>
         <p:spPr>
           <a:xfrm>
-            <a:off x="685800" y="2130425"/>
-            <a:ext cx="7772400" cy="1470025"/>
+            <a:off x="6642100" y="6038850"/>
+            <a:ext cx="2133600" cy="206375"/>
           </a:xfrm>
-        </p:spPr>
-        <p:txBody>
-          <a:bodyPr/>
-          <a:lstStyle/>
-          <a:p>
-            <a:r>
-              <a:rPr lang="en-US" smtClean="0"/>
-              <a:t>Click to edit Master title style</a:t>
-            </a:r>
-            <a:endParaRPr lang="en-US"/>
-          </a:p>
-        </p:txBody>
-      </p:sp>
-      <p:sp>
-        <p:nvSpPr>
-          <p:cNvPr id="3" name="Subtitle 2"/>
-          <p:cNvSpPr>
-            <a:spLocks noGrp="1"/>
-          </p:cNvSpPr>
-          <p:nvPr>
-            <p:ph type="subTitle" idx="1"/>
-          </p:nvPr>
-        </p:nvSpPr>
-        <p:spPr>
-          <a:xfrm>
-            <a:off x="1371600" y="3886200"/>
-            <a:ext cx="6400800" cy="1752600"/>
-          </a:xfrm>
+          <a:prstGeom prst="rect">
+            <a:avLst/>
+          </a:prstGeom>
         </p:spPr>
         <p:txBody>
           <a:bodyPr/>
           <a:lstStyle>
-            <a:lvl1pPr marL="0" indent="0" algn="ctr">
-              <a:buNone/>
-              <a:defRPr/>
+            <a:lvl1pPr algn="r">
+              <a:defRPr sz="800"/>
             </a:lvl1pPr>
-            <a:lvl2pPr marL="457200" indent="0" algn="ctr">
-              <a:buNone/>
-              <a:defRPr/>
-            </a:lvl2pPr>
-            <a:lvl3pPr marL="914400" indent="0" algn="ctr">
-              <a:buNone/>
-              <a:defRPr/>
-            </a:lvl3pPr>
-            <a:lvl4pPr marL="1371600" indent="0" algn="ctr">
-              <a:buNone/>
-              <a:defRPr/>
-            </a:lvl4pPr>
-            <a:lvl5pPr marL="1828800" indent="0" algn="ctr">
-              <a:buNone/>
-              <a:defRPr/>
-            </a:lvl5pPr>
-            <a:lvl6pPr marL="2286000" indent="0" algn="ctr">
-              <a:buNone/>
-              <a:defRPr/>
-            </a:lvl6pPr>
-            <a:lvl7pPr marL="2743200" indent="0" algn="ctr">
-              <a:buNone/>
-              <a:defRPr/>
-            </a:lvl7pPr>
-            <a:lvl8pPr marL="3200400" indent="0" algn="ctr">
-              <a:buNone/>
-              <a:defRPr/>
-            </a:lvl8pPr>
-            <a:lvl9pPr marL="3657600" indent="0" algn="ctr">
-              <a:buNone/>
-              <a:defRPr/>
-            </a:lvl9pPr>
           </a:lstStyle>
           <a:p>
-            <a:r>
+            <a:fld id="{F2394529-A9B3-4A54-83EC-E61379E8334E}" type="slidenum">
               <a:rPr lang="en-US" smtClean="0"/>
-              <a:t>Click to edit Master subtitle style</a:t>
-            </a:r>
-            <a:endParaRPr lang="en-US"/>
+              <a:pPr/>
+              <a:t>‹#›</a:t>
+            </a:fld>
+            <a:endParaRPr lang="en-US" dirty="0"/>
           </a:p>
         </p:txBody>
       </p:sp>
@@ -1628,38 +1879,10 @@
   <p:clrMapOvr>
     <a:masterClrMapping/>
   </p:clrMapOvr>
-  <p:transition spd="med">
-    <p:fade/>
-  </p:transition>
 </p:sldLayout>
 </file>
 
-<file path=ppt/slideLayouts/slideLayout3.xml><?xml version="1.0" encoding="utf-8"?>
-<p:sldLayout xmlns:a="http://schemas.openxmlformats.org/drawingml/2006/main" xmlns:r="http://schemas.openxmlformats.org/officeDocument/2006/relationships" xmlns:p="http://schemas.openxmlformats.org/presentationml/2006/main" type="blank">
-  <p:cSld name="Blank">
-    <p:spTree>
-      <p:nvGrpSpPr>
-        <p:cNvPr id="1" name=""/>
-        <p:cNvGrpSpPr/>
-        <p:nvPr/>
-      </p:nvGrpSpPr>
-      <p:grpSpPr>
-        <a:xfrm>
-          <a:off x="0" y="0"/>
-          <a:ext cx="0" cy="0"/>
-          <a:chOff x="0" y="0"/>
-          <a:chExt cx="0" cy="0"/>
-        </a:xfrm>
-      </p:grpSpPr>
-    </p:spTree>
-  </p:cSld>
-  <p:clrMapOvr>
-    <a:masterClrMapping/>
-  </p:clrMapOvr>
-</p:sldLayout>
-</file>
-
-<file path=ppt/slideLayouts/slideLayout4.xml><?xml version="1.0" encoding="utf-8"?>
+<file path=ppt/slideLayouts/slideLayout5.xml><?xml version="1.0" encoding="utf-8"?>
 <p:sldLayout xmlns:a="http://schemas.openxmlformats.org/drawingml/2006/main" xmlns:r="http://schemas.openxmlformats.org/officeDocument/2006/relationships" xmlns:p="http://schemas.openxmlformats.org/presentationml/2006/main" userDrawn="1">
   <p:cSld name="Advance Organizer Between Sections">
     <p:spTree>
@@ -1763,6 +1986,42 @@
           </a:p>
         </p:txBody>
       </p:sp>
+      <p:sp>
+        <p:nvSpPr>
+          <p:cNvPr id="4" name="Rectangle 24"/>
+          <p:cNvSpPr>
+            <a:spLocks noGrp="1" noChangeArrowheads="1"/>
+          </p:cNvSpPr>
+          <p:nvPr>
+            <p:ph type="sldNum" sz="quarter" idx="4"/>
+          </p:nvPr>
+        </p:nvSpPr>
+        <p:spPr>
+          <a:xfrm>
+            <a:off x="6642100" y="6038850"/>
+            <a:ext cx="2133600" cy="206375"/>
+          </a:xfrm>
+          <a:prstGeom prst="rect">
+            <a:avLst/>
+          </a:prstGeom>
+        </p:spPr>
+        <p:txBody>
+          <a:bodyPr/>
+          <a:lstStyle>
+            <a:lvl1pPr algn="r">
+              <a:defRPr sz="800"/>
+            </a:lvl1pPr>
+          </a:lstStyle>
+          <a:p>
+            <a:fld id="{F2394529-A9B3-4A54-83EC-E61379E8334E}" type="slidenum">
+              <a:rPr lang="en-US" smtClean="0"/>
+              <a:pPr/>
+              <a:t>‹#›</a:t>
+            </a:fld>
+            <a:endParaRPr lang="en-US" dirty="0"/>
+          </a:p>
+        </p:txBody>
+      </p:sp>
     </p:spTree>
   </p:cSld>
   <p:clrMapOvr>
@@ -1771,7 +2030,7 @@
 </p:sldLayout>
 </file>
 
-<file path=ppt/slideLayouts/slideLayout5.xml><?xml version="1.0" encoding="utf-8"?>
+<file path=ppt/slideLayouts/slideLayout6.xml><?xml version="1.0" encoding="utf-8"?>
 <p:sldLayout xmlns:a="http://schemas.openxmlformats.org/drawingml/2006/main" xmlns:r="http://schemas.openxmlformats.org/officeDocument/2006/relationships" xmlns:p="http://schemas.openxmlformats.org/presentationml/2006/main" type="titleOnly">
   <p:cSld name="Title Only">
     <p:spTree>
@@ -1813,18 +2072,18 @@
       </p:sp>
       <p:sp>
         <p:nvSpPr>
-          <p:cNvPr id="3" name="Date Placeholder 2"/>
+          <p:cNvPr id="6" name="Rectangle 24"/>
           <p:cNvSpPr>
-            <a:spLocks noGrp="1"/>
+            <a:spLocks noGrp="1" noChangeArrowheads="1"/>
           </p:cNvSpPr>
           <p:nvPr>
-            <p:ph type="dt" sz="half" idx="10"/>
+            <p:ph type="sldNum" sz="quarter" idx="4"/>
           </p:nvPr>
         </p:nvSpPr>
         <p:spPr>
           <a:xfrm>
-            <a:off x="457200" y="6356350"/>
-            <a:ext cx="2133600" cy="365125"/>
+            <a:off x="6642100" y="6038850"/>
+            <a:ext cx="2133600" cy="206375"/>
           </a:xfrm>
           <a:prstGeom prst="rect">
             <a:avLst/>
@@ -1832,68 +2091,13 @@
         </p:spPr>
         <p:txBody>
           <a:bodyPr/>
-          <a:lstStyle/>
+          <a:lstStyle>
+            <a:lvl1pPr algn="r">
+              <a:defRPr sz="800"/>
+            </a:lvl1pPr>
+          </a:lstStyle>
           <a:p>
-            <a:fld id="{92581241-622C-4796-B8B9-62EF4BF9D987}" type="datetimeFigureOut">
-              <a:rPr lang="en-US" smtClean="0"/>
-              <a:pPr/>
-              <a:t>3/11/2013</a:t>
-            </a:fld>
-            <a:endParaRPr lang="en-US" dirty="0"/>
-          </a:p>
-        </p:txBody>
-      </p:sp>
-      <p:sp>
-        <p:nvSpPr>
-          <p:cNvPr id="4" name="Footer Placeholder 3"/>
-          <p:cNvSpPr>
-            <a:spLocks noGrp="1"/>
-          </p:cNvSpPr>
-          <p:nvPr>
-            <p:ph type="ftr" sz="quarter" idx="11"/>
-          </p:nvPr>
-        </p:nvSpPr>
-        <p:spPr>
-          <a:xfrm>
-            <a:off x="3124200" y="6356350"/>
-            <a:ext cx="2895600" cy="365125"/>
-          </a:xfrm>
-          <a:prstGeom prst="rect">
-            <a:avLst/>
-          </a:prstGeom>
-        </p:spPr>
-        <p:txBody>
-          <a:bodyPr/>
-          <a:lstStyle/>
-          <a:p>
-            <a:endParaRPr lang="en-US" dirty="0"/>
-          </a:p>
-        </p:txBody>
-      </p:sp>
-      <p:sp>
-        <p:nvSpPr>
-          <p:cNvPr id="5" name="Slide Number Placeholder 4"/>
-          <p:cNvSpPr>
-            <a:spLocks noGrp="1"/>
-          </p:cNvSpPr>
-          <p:nvPr>
-            <p:ph type="sldNum" sz="quarter" idx="12"/>
-          </p:nvPr>
-        </p:nvSpPr>
-        <p:spPr>
-          <a:xfrm>
-            <a:off x="6553200" y="6356350"/>
-            <a:ext cx="2133600" cy="365125"/>
-          </a:xfrm>
-          <a:prstGeom prst="rect">
-            <a:avLst/>
-          </a:prstGeom>
-        </p:spPr>
-        <p:txBody>
-          <a:bodyPr/>
-          <a:lstStyle/>
-          <a:p>
-            <a:fld id="{FE8CBB5C-3634-4700-B735-F92BC5410C31}" type="slidenum">
+            <a:fld id="{F2394529-A9B3-4A54-83EC-E61379E8334E}" type="slidenum">
               <a:rPr lang="en-US" smtClean="0"/>
               <a:pPr/>
               <a:t>‹#›</a:t>
@@ -1971,7 +2175,7 @@
           <a:p>
             <a:pPr lvl="0"/>
             <a:r>
-              <a:rPr lang="en-US" smtClean="0"/>
+              <a:rPr lang="en-US" dirty="0" smtClean="0"/>
               <a:t>Click to edit Master title style</a:t>
             </a:r>
           </a:p>
@@ -2049,68 +2253,62 @@
       </p:sp>
       <p:sp>
         <p:nvSpPr>
-          <p:cNvPr id="8" name="Rectangle 25"/>
-          <p:cNvSpPr>
-            <a:spLocks noChangeArrowheads="1"/>
-          </p:cNvSpPr>
+          <p:cNvPr id="9" name="Rectangle 8"/>
+          <p:cNvSpPr/>
           <p:nvPr userDrawn="1"/>
         </p:nvSpPr>
-        <p:spPr bwMode="auto">
+        <p:spPr>
           <a:xfrm>
-            <a:off x="338138" y="6477000"/>
-            <a:ext cx="8462962" cy="315913"/>
+            <a:off x="0" y="6321425"/>
+            <a:ext cx="8810625" cy="466344"/>
           </a:xfrm>
           <a:prstGeom prst="rect">
             <a:avLst/>
           </a:prstGeom>
-          <a:noFill/>
+          <a:solidFill>
+            <a:schemeClr val="bg1"/>
+          </a:solidFill>
           <a:ln w="9525">
             <a:solidFill>
-              <a:schemeClr val="tx1"/>
+              <a:srgbClr val="AAAAAA"/>
             </a:solidFill>
-            <a:miter lim="800000"/>
-            <a:headEnd/>
-            <a:tailEnd/>
           </a:ln>
-          <a:effectLst/>
         </p:spPr>
+        <p:style>
+          <a:lnRef idx="2">
+            <a:schemeClr val="accent1">
+              <a:shade val="50000"/>
+            </a:schemeClr>
+          </a:lnRef>
+          <a:fillRef idx="1">
+            <a:schemeClr val="accent1"/>
+          </a:fillRef>
+          <a:effectRef idx="0">
+            <a:schemeClr val="accent1"/>
+          </a:effectRef>
+          <a:fontRef idx="minor">
+            <a:schemeClr val="lt1"/>
+          </a:fontRef>
+        </p:style>
         <p:txBody>
-          <a:bodyPr wrap="none" anchor="ctr"/>
+          <a:bodyPr rtlCol="0" anchor="ctr"/>
           <a:lstStyle/>
           <a:p>
-            <a:pPr fontAlgn="auto">
-              <a:spcBef>
-                <a:spcPts val="0"/>
-              </a:spcBef>
-              <a:spcAft>
-                <a:spcPts val="0"/>
-              </a:spcAft>
-              <a:defRPr/>
-            </a:pPr>
-            <a:endParaRPr lang="en-US" dirty="0">
-              <a:solidFill>
-                <a:srgbClr val="000000"/>
-              </a:solidFill>
-              <a:latin typeface="Calibri"/>
-              <a:cs typeface="Arial" charset="0"/>
-            </a:endParaRPr>
+            <a:pPr algn="ctr"/>
+            <a:endParaRPr lang="en-US"/>
           </a:p>
         </p:txBody>
       </p:sp>
       <p:pic>
         <p:nvPicPr>
-          <p:cNvPr id="31749" name="Picture 8" descr="ti_hz_1c_pos_rgb_jpg.jpg"/>
+          <p:cNvPr id="11" name="Picture 27" descr="ti_logo_powerpoint_1_line.png"/>
           <p:cNvPicPr>
             <a:picLocks noChangeAspect="1"/>
           </p:cNvPicPr>
-          <p:nvPr userDrawn="1">
-            <p:custDataLst>
-              <p:tags r:id="rId7"/>
-            </p:custDataLst>
-          </p:nvPr>
+          <p:nvPr userDrawn="1"/>
         </p:nvPicPr>
         <p:blipFill>
-          <a:blip r:embed="rId9" cstate="print"/>
+          <a:blip r:embed="rId8" cstate="print"/>
           <a:srcRect/>
           <a:stretch>
             <a:fillRect/>
@@ -2118,8 +2316,8 @@
         </p:blipFill>
         <p:spPr bwMode="auto">
           <a:xfrm>
-            <a:off x="361950" y="6503988"/>
-            <a:ext cx="1131888" cy="260350"/>
+            <a:off x="6675438" y="6440488"/>
+            <a:ext cx="1874837" cy="231775"/>
           </a:xfrm>
           <a:prstGeom prst="rect">
             <a:avLst/>
@@ -2135,81 +2333,37 @@
       </p:pic>
       <p:sp>
         <p:nvSpPr>
-          <p:cNvPr id="10" name="Rectangle 9"/>
-          <p:cNvSpPr/>
-          <p:nvPr userDrawn="1">
-            <p:custDataLst>
-              <p:tags r:id="rId8"/>
-            </p:custDataLst>
+          <p:cNvPr id="12" name="Rectangle 24"/>
+          <p:cNvSpPr>
+            <a:spLocks noGrp="1" noChangeArrowheads="1"/>
+          </p:cNvSpPr>
+          <p:nvPr>
+            <p:ph type="sldNum" sz="quarter" idx="4"/>
           </p:nvPr>
         </p:nvSpPr>
         <p:spPr>
           <a:xfrm>
-            <a:off x="7425271" y="6498264"/>
-            <a:ext cx="1357103" cy="276999"/>
+            <a:off x="6642100" y="6038850"/>
+            <a:ext cx="2133600" cy="206375"/>
           </a:xfrm>
           <a:prstGeom prst="rect">
             <a:avLst/>
           </a:prstGeom>
-          <a:solidFill>
-            <a:schemeClr val="bg1"/>
-          </a:solidFill>
         </p:spPr>
         <p:txBody>
-          <a:bodyPr wrap="none">
-            <a:spAutoFit/>
-          </a:bodyPr>
-          <a:lstStyle/>
+          <a:bodyPr/>
+          <a:lstStyle>
+            <a:lvl1pPr algn="r">
+              <a:defRPr sz="800"/>
+            </a:lvl1pPr>
+          </a:lstStyle>
           <a:p>
-            <a:pPr algn="ctr" fontAlgn="auto">
-              <a:spcBef>
-                <a:spcPts val="0"/>
-              </a:spcBef>
-              <a:spcAft>
-                <a:spcPts val="0"/>
-              </a:spcAft>
-              <a:defRPr/>
-            </a:pPr>
-            <a:r>
-              <a:rPr lang="en-US" sz="1200" b="1" dirty="0" smtClean="0">
-                <a:ln w="10541" cmpd="sng">
-                  <a:solidFill>
-                    <a:srgbClr val="7D7D7D">
-                      <a:tint val="100000"/>
-                      <a:shade val="100000"/>
-                      <a:satMod val="110000"/>
-                    </a:srgbClr>
-                  </a:solidFill>
-                  <a:prstDash val="solid"/>
-                </a:ln>
-                <a:solidFill>
-                  <a:srgbClr val="000000"/>
-                </a:solidFill>
-                <a:latin typeface="Calibri"/>
-                <a:cs typeface="Arial" charset="0"/>
-              </a:rPr>
-              <a:t>Multicore </a:t>
-            </a:r>
-            <a:r>
-              <a:rPr lang="en-US" sz="1200" b="1" dirty="0">
-                <a:ln w="10541" cmpd="sng">
-                  <a:solidFill>
-                    <a:srgbClr val="7D7D7D">
-                      <a:tint val="100000"/>
-                      <a:shade val="100000"/>
-                      <a:satMod val="110000"/>
-                    </a:srgbClr>
-                  </a:solidFill>
-                  <a:prstDash val="solid"/>
-                </a:ln>
-                <a:solidFill>
-                  <a:srgbClr val="000000"/>
-                </a:solidFill>
-                <a:latin typeface="Calibri"/>
-                <a:cs typeface="Arial" charset="0"/>
-              </a:rPr>
-              <a:t>Training</a:t>
-            </a:r>
+            <a:fld id="{F2394529-A9B3-4A54-83EC-E61379E8334E}" type="slidenum">
+              <a:rPr lang="en-US" smtClean="0"/>
+              <a:pPr/>
+              <a:t>‹#›</a:t>
+            </a:fld>
+            <a:endParaRPr lang="en-US" dirty="0"/>
           </a:p>
         </p:txBody>
       </p:sp>
@@ -2219,10 +2373,12 @@
   <p:sldLayoutIdLst>
     <p:sldLayoutId id="2147483661" r:id="rId1"/>
     <p:sldLayoutId id="2147483663" r:id="rId2"/>
-    <p:sldLayoutId id="2147483664" r:id="rId3"/>
-    <p:sldLayoutId id="2147483665" r:id="rId4"/>
-    <p:sldLayoutId id="2147483666" r:id="rId5"/>
+    <p:sldLayoutId id="2147483667" r:id="rId3"/>
+    <p:sldLayoutId id="2147483664" r:id="rId4"/>
+    <p:sldLayoutId id="2147483665" r:id="rId5"/>
+    <p:sldLayoutId id="2147483666" r:id="rId6"/>
   </p:sldLayoutIdLst>
+  <p:hf hdr="0" ftr="0" dt="0"/>
   <p:txStyles>
     <p:titleStyle>
       <a:lvl1pPr algn="ctr" rtl="0" eaLnBrk="0" fontAlgn="base" hangingPunct="0">
@@ -2234,7 +2390,7 @@
         </a:spcAft>
         <a:defRPr sz="4400" b="1">
           <a:solidFill>
-            <a:schemeClr val="tx1"/>
+            <a:srgbClr val="DE0000"/>
           </a:solidFill>
           <a:latin typeface="+mj-lt"/>
           <a:ea typeface="+mj-ea"/>
@@ -2620,7 +2776,7 @@
       </p:grpSpPr>
       <p:sp>
         <p:nvSpPr>
-          <p:cNvPr id="4" name="Title 3"/>
+          <p:cNvPr id="2" name="Title 1"/>
           <p:cNvSpPr>
             <a:spLocks noGrp="1"/>
           </p:cNvSpPr>
@@ -2628,41 +2784,29 @@
             <p:ph type="ctrTitle"/>
           </p:nvPr>
         </p:nvSpPr>
-        <p:spPr>
-          <a:xfrm>
-            <a:off x="609600" y="914400"/>
-            <a:ext cx="7772400" cy="2849880"/>
-          </a:xfrm>
-        </p:spPr>
+        <p:spPr/>
         <p:txBody>
-          <a:bodyPr>
-            <a:noAutofit/>
-          </a:bodyPr>
+          <a:bodyPr/>
           <a:lstStyle/>
           <a:p>
-            <a:pPr>
-              <a:lnSpc>
-                <a:spcPct val="105000"/>
-              </a:lnSpc>
-            </a:pPr>
             <a:r>
-              <a:rPr lang="en-US" sz="5400" b="0" dirty="0" smtClean="0"/>
+              <a:rPr lang="en-US" dirty="0" smtClean="0"/>
               <a:t>KeyStone </a:t>
             </a:r>
             <a:br>
-              <a:rPr lang="en-US" sz="5400" b="0" dirty="0" smtClean="0"/>
+              <a:rPr lang="en-US" dirty="0" smtClean="0"/>
             </a:br>
             <a:r>
-              <a:rPr lang="en-US" sz="5400" b="0" dirty="0" smtClean="0"/>
+              <a:rPr lang="en-US" dirty="0" smtClean="0"/>
               <a:t>C66x CorePac Overview</a:t>
             </a:r>
-            <a:endParaRPr lang="en-US" sz="5400" b="0" dirty="0"/>
+            <a:endParaRPr lang="en-US" dirty="0"/>
           </a:p>
         </p:txBody>
       </p:sp>
       <p:sp>
         <p:nvSpPr>
-          <p:cNvPr id="5" name="Subtitle 4"/>
+          <p:cNvPr id="3" name="Subtitle 2"/>
           <p:cNvSpPr>
             <a:spLocks noGrp="1"/>
           </p:cNvSpPr>
@@ -2672,23 +2816,25 @@
         </p:nvSpPr>
         <p:spPr/>
         <p:txBody>
-          <a:bodyPr>
-            <a:normAutofit/>
-          </a:bodyPr>
+          <a:bodyPr/>
           <a:lstStyle/>
           <a:p>
             <a:r>
-              <a:rPr lang="en-US" sz="2800" dirty="0" smtClean="0"/>
+              <a:rPr lang="en-US" dirty="0" smtClean="0"/>
+              <a:t>KeyStone Training</a:t>
+            </a:r>
+          </a:p>
+          <a:p>
+            <a:r>
+              <a:rPr lang="en-US" dirty="0" smtClean="0"/>
               <a:t>Multicore Applications</a:t>
             </a:r>
-            <a:endParaRPr lang="en-US" sz="2800" dirty="0">
-              <a:solidFill>
-                <a:schemeClr val="tx1">
-                  <a:lumMod val="75000"/>
-                  <a:lumOff val="25000"/>
-                </a:schemeClr>
-              </a:solidFill>
-            </a:endParaRPr>
+          </a:p>
+          <a:p>
+            <a:r>
+              <a:rPr lang="en-US" dirty="0" smtClean="0"/>
+              <a:t>Literature Number: SPRP806</a:t>
+            </a:r>
           </a:p>
         </p:txBody>
       </p:sp>
@@ -2730,7 +2876,7 @@
         </p:nvPicPr>
         <p:blipFill>
           <a:blip r:embed="rId3" cstate="print"/>
-          <a:srcRect/>
+          <a:srcRect b="4094"/>
           <a:stretch>
             <a:fillRect/>
           </a:stretch>
@@ -2738,7 +2884,7 @@
         <p:spPr bwMode="auto">
           <a:xfrm>
             <a:off x="533400" y="914400"/>
-            <a:ext cx="8100757" cy="5562600"/>
+            <a:ext cx="8100757" cy="5334883"/>
           </a:xfrm>
           <a:prstGeom prst="rect">
             <a:avLst/>
@@ -2782,6 +2928,30 @@
           </a:p>
         </p:txBody>
       </p:sp>
+      <p:sp>
+        <p:nvSpPr>
+          <p:cNvPr id="5" name="Slide Number Placeholder 4"/>
+          <p:cNvSpPr>
+            <a:spLocks noGrp="1"/>
+          </p:cNvSpPr>
+          <p:nvPr>
+            <p:ph type="sldNum" sz="quarter" idx="4"/>
+          </p:nvPr>
+        </p:nvSpPr>
+        <p:spPr/>
+        <p:txBody>
+          <a:bodyPr/>
+          <a:lstStyle/>
+          <a:p>
+            <a:fld id="{F2394529-A9B3-4A54-83EC-E61379E8334E}" type="slidenum">
+              <a:rPr lang="en-US" smtClean="0"/>
+              <a:pPr/>
+              <a:t>10</a:t>
+            </a:fld>
+            <a:endParaRPr lang="en-US" dirty="0"/>
+          </a:p>
+        </p:txBody>
+      </p:sp>
     </p:spTree>
     <p:custDataLst>
       <p:tags r:id="rId1"/>
@@ -2819,14 +2989,14 @@
       </p:grpSpPr>
       <p:sp>
         <p:nvSpPr>
-          <p:cNvPr id="5" name="TextBox 4"/>
+          <p:cNvPr id="7" name="TextBox 6"/>
           <p:cNvSpPr txBox="1"/>
           <p:nvPr/>
         </p:nvSpPr>
         <p:spPr>
           <a:xfrm>
-            <a:off x="228600" y="6460272"/>
-            <a:ext cx="8763000" cy="369332"/>
+            <a:off x="0" y="6309732"/>
+            <a:ext cx="8991600" cy="505004"/>
           </a:xfrm>
           <a:prstGeom prst="rect">
             <a:avLst/>
@@ -2837,7 +3007,7 @@
         </p:spPr>
         <p:txBody>
           <a:bodyPr wrap="square" rtlCol="0">
-            <a:spAutoFit/>
+            <a:noAutofit/>
           </a:bodyPr>
           <a:lstStyle/>
           <a:p>
@@ -2894,6 +3064,30 @@
           </a:prstGeom>
         </p:spPr>
       </p:pic>
+      <p:sp>
+        <p:nvSpPr>
+          <p:cNvPr id="8" name="Slide Number Placeholder 7"/>
+          <p:cNvSpPr>
+            <a:spLocks noGrp="1"/>
+          </p:cNvSpPr>
+          <p:nvPr>
+            <p:ph type="sldNum" sz="quarter" idx="4"/>
+          </p:nvPr>
+        </p:nvSpPr>
+        <p:spPr/>
+        <p:txBody>
+          <a:bodyPr/>
+          <a:lstStyle/>
+          <a:p>
+            <a:fld id="{F2394529-A9B3-4A54-83EC-E61379E8334E}" type="slidenum">
+              <a:rPr lang="en-US" smtClean="0"/>
+              <a:pPr/>
+              <a:t>11</a:t>
+            </a:fld>
+            <a:endParaRPr lang="en-US" dirty="0"/>
+          </a:p>
+        </p:txBody>
+      </p:sp>
     </p:spTree>
     <p:custDataLst>
       <p:tags r:id="rId1"/>
@@ -2931,14 +3125,14 @@
       </p:grpSpPr>
       <p:sp>
         <p:nvSpPr>
-          <p:cNvPr id="5" name="TextBox 4"/>
+          <p:cNvPr id="6" name="TextBox 5"/>
           <p:cNvSpPr txBox="1"/>
           <p:nvPr/>
         </p:nvSpPr>
         <p:spPr>
           <a:xfrm>
-            <a:off x="228600" y="6460272"/>
-            <a:ext cx="8763000" cy="369332"/>
+            <a:off x="0" y="6309732"/>
+            <a:ext cx="8991600" cy="505004"/>
           </a:xfrm>
           <a:prstGeom prst="rect">
             <a:avLst/>
@@ -2949,7 +3143,7 @@
         </p:spPr>
         <p:txBody>
           <a:bodyPr wrap="square" rtlCol="0">
-            <a:spAutoFit/>
+            <a:noAutofit/>
           </a:bodyPr>
           <a:lstStyle/>
           <a:p>
@@ -3014,6 +3208,30 @@
           </a:ln>
         </p:spPr>
       </p:pic>
+      <p:sp>
+        <p:nvSpPr>
+          <p:cNvPr id="7" name="Slide Number Placeholder 6"/>
+          <p:cNvSpPr>
+            <a:spLocks noGrp="1"/>
+          </p:cNvSpPr>
+          <p:nvPr>
+            <p:ph type="sldNum" sz="quarter" idx="4"/>
+          </p:nvPr>
+        </p:nvSpPr>
+        <p:spPr/>
+        <p:txBody>
+          <a:bodyPr/>
+          <a:lstStyle/>
+          <a:p>
+            <a:fld id="{F2394529-A9B3-4A54-83EC-E61379E8334E}" type="slidenum">
+              <a:rPr lang="en-US" smtClean="0"/>
+              <a:pPr/>
+              <a:t>12</a:t>
+            </a:fld>
+            <a:endParaRPr lang="en-US" dirty="0"/>
+          </a:p>
+        </p:txBody>
+      </p:sp>
     </p:spTree>
     <p:custDataLst>
       <p:tags r:id="rId1"/>
@@ -3166,6 +3384,30 @@
           </a:p>
           <a:p>
             <a:pPr lvl="1"/>
+            <a:endParaRPr lang="en-US" dirty="0"/>
+          </a:p>
+        </p:txBody>
+      </p:sp>
+      <p:sp>
+        <p:nvSpPr>
+          <p:cNvPr id="6" name="Slide Number Placeholder 5"/>
+          <p:cNvSpPr>
+            <a:spLocks noGrp="1"/>
+          </p:cNvSpPr>
+          <p:nvPr>
+            <p:ph type="sldNum" sz="quarter" idx="4"/>
+          </p:nvPr>
+        </p:nvSpPr>
+        <p:spPr/>
+        <p:txBody>
+          <a:bodyPr/>
+          <a:lstStyle/>
+          <a:p>
+            <a:fld id="{F2394529-A9B3-4A54-83EC-E61379E8334E}" type="slidenum">
+              <a:rPr lang="en-US" smtClean="0"/>
+              <a:pPr/>
+              <a:t>13</a:t>
+            </a:fld>
             <a:endParaRPr lang="en-US" dirty="0"/>
           </a:p>
         </p:txBody>
@@ -3338,6 +3580,30 @@
           </a:p>
         </p:txBody>
       </p:sp>
+      <p:sp>
+        <p:nvSpPr>
+          <p:cNvPr id="6" name="Slide Number Placeholder 5"/>
+          <p:cNvSpPr>
+            <a:spLocks noGrp="1"/>
+          </p:cNvSpPr>
+          <p:nvPr>
+            <p:ph type="sldNum" sz="quarter" idx="4"/>
+          </p:nvPr>
+        </p:nvSpPr>
+        <p:spPr/>
+        <p:txBody>
+          <a:bodyPr/>
+          <a:lstStyle/>
+          <a:p>
+            <a:fld id="{F2394529-A9B3-4A54-83EC-E61379E8334E}" type="slidenum">
+              <a:rPr lang="en-US" smtClean="0"/>
+              <a:pPr/>
+              <a:t>14</a:t>
+            </a:fld>
+            <a:endParaRPr lang="en-US" dirty="0"/>
+          </a:p>
+        </p:txBody>
+      </p:sp>
     </p:spTree>
   </p:cSld>
   <p:clrMapOvr>
@@ -3455,6 +3721,30 @@
           </a:p>
         </p:txBody>
       </p:sp>
+      <p:sp>
+        <p:nvSpPr>
+          <p:cNvPr id="6" name="Slide Number Placeholder 5"/>
+          <p:cNvSpPr>
+            <a:spLocks noGrp="1"/>
+          </p:cNvSpPr>
+          <p:nvPr>
+            <p:ph type="sldNum" sz="quarter" idx="4"/>
+          </p:nvPr>
+        </p:nvSpPr>
+        <p:spPr/>
+        <p:txBody>
+          <a:bodyPr/>
+          <a:lstStyle/>
+          <a:p>
+            <a:fld id="{F2394529-A9B3-4A54-83EC-E61379E8334E}" type="slidenum">
+              <a:rPr lang="en-US" smtClean="0"/>
+              <a:pPr/>
+              <a:t>15</a:t>
+            </a:fld>
+            <a:endParaRPr lang="en-US" dirty="0"/>
+          </a:p>
+        </p:txBody>
+      </p:sp>
     </p:spTree>
   </p:cSld>
   <p:clrMapOvr>
@@ -3494,127 +3784,49 @@
             <a:spLocks noGrp="1"/>
           </p:cNvSpPr>
           <p:nvPr>
-            <p:ph type="title"/>
+            <p:ph type="ctrTitle"/>
           </p:nvPr>
         </p:nvSpPr>
         <p:spPr/>
         <p:txBody>
-          <a:bodyPr>
-            <a:normAutofit/>
-          </a:bodyPr>
+          <a:bodyPr/>
           <a:lstStyle/>
           <a:p>
             <a:r>
-              <a:rPr lang="en-US" sz="4000" dirty="0" smtClean="0"/>
-              <a:t>C66x CorePac Features: SIMD</a:t>
+              <a:rPr lang="en-US" dirty="0" smtClean="0"/>
+              <a:t>C66x CorePac Features:</a:t>
             </a:r>
+            <a:br>
+              <a:rPr lang="en-US" dirty="0" smtClean="0"/>
+            </a:br>
+            <a:r>
+              <a:rPr lang="en-US" dirty="0" smtClean="0"/>
+              <a:t>Single Instruction Multiple Data (SIMD)</a:t>
+            </a:r>
+            <a:endParaRPr lang="en-US" dirty="0"/>
           </a:p>
         </p:txBody>
       </p:sp>
       <p:sp>
         <p:nvSpPr>
-          <p:cNvPr id="3" name="Content Placeholder 2"/>
+          <p:cNvPr id="3" name="Subtitle 2"/>
           <p:cNvSpPr>
             <a:spLocks noGrp="1"/>
           </p:cNvSpPr>
           <p:nvPr>
-            <p:ph idx="1"/>
+            <p:ph type="subTitle" idx="1"/>
           </p:nvPr>
         </p:nvSpPr>
-        <p:spPr>
-          <a:noFill/>
-          <a:ln>
-            <a:noFill/>
-          </a:ln>
-        </p:spPr>
+        <p:spPr/>
         <p:txBody>
-          <a:bodyPr>
-            <a:normAutofit lnSpcReduction="10000"/>
-          </a:bodyPr>
+          <a:bodyPr/>
           <a:lstStyle/>
           <a:p>
             <a:r>
               <a:rPr lang="en-US" dirty="0" smtClean="0"/>
-              <a:t>C66x CorePac in KeyStone</a:t>
+              <a:t>C66x CorePac Overview</a:t>
             </a:r>
-          </a:p>
-          <a:p>
-            <a:r>
-              <a:rPr lang="en-US" b="1" dirty="0" smtClean="0"/>
-              <a:t>C66x CorePac Features</a:t>
-            </a:r>
-          </a:p>
-          <a:p>
-            <a:pPr marL="811213" lvl="1" indent="-514350" eaLnBrk="1" fontAlgn="auto" hangingPunct="1">
-              <a:spcAft>
-                <a:spcPts val="0"/>
-              </a:spcAft>
-              <a:defRPr/>
-            </a:pPr>
-            <a:r>
-              <a:rPr lang="en-US" dirty="0" smtClean="0"/>
-              <a:t>DSP Core Architecture</a:t>
-            </a:r>
-          </a:p>
-          <a:p>
-            <a:pPr marL="811213" lvl="1" indent="-514350" eaLnBrk="1" fontAlgn="auto" hangingPunct="1">
-              <a:spcAft>
-                <a:spcPts val="0"/>
-              </a:spcAft>
-              <a:defRPr/>
-            </a:pPr>
-            <a:r>
-              <a:rPr lang="en-US" b="1" dirty="0" smtClean="0"/>
-              <a:t>Single Instruction Multiple Data (SIMD)</a:t>
-            </a:r>
-          </a:p>
-          <a:p>
-            <a:pPr marL="811213" lvl="1" indent="-514350" eaLnBrk="1" fontAlgn="auto" hangingPunct="1">
-              <a:spcAft>
-                <a:spcPts val="0"/>
-              </a:spcAft>
-              <a:defRPr/>
-            </a:pPr>
-            <a:r>
-              <a:rPr lang="en-US" dirty="0" smtClean="0"/>
-              <a:t>Memory Access </a:t>
-            </a:r>
-          </a:p>
-          <a:p>
-            <a:pPr marL="811213" lvl="1" indent="-514350" eaLnBrk="1" fontAlgn="auto" hangingPunct="1">
-              <a:spcAft>
-                <a:spcPts val="0"/>
-              </a:spcAft>
-              <a:defRPr/>
-            </a:pPr>
-            <a:r>
-              <a:rPr lang="en-US" dirty="0" smtClean="0"/>
-              <a:t>Pipeline Concept</a:t>
-            </a:r>
-          </a:p>
-          <a:p>
-            <a:r>
-              <a:rPr lang="en-US" dirty="0" smtClean="0"/>
-              <a:t>Interface to the SOC</a:t>
-            </a:r>
-          </a:p>
-          <a:p>
-            <a:r>
-              <a:rPr lang="en-US" dirty="0" smtClean="0"/>
-              <a:t>Interrupt Controller</a:t>
-            </a:r>
-          </a:p>
-          <a:p>
-            <a:r>
-              <a:rPr lang="en-US" dirty="0" smtClean="0"/>
-              <a:t>Power Management</a:t>
-            </a:r>
-          </a:p>
-          <a:p>
-            <a:r>
-              <a:rPr lang="en-US" dirty="0" smtClean="0"/>
-              <a:t>Debug and Trace</a:t>
-            </a:r>
+            <a:endParaRPr lang="en-US" dirty="0"/>
           </a:p>
         </p:txBody>
       </p:sp>
@@ -3623,13 +3835,9 @@
   <p:clrMapOvr>
     <a:masterClrMapping/>
   </p:clrMapOvr>
-  <p:timing>
-    <p:tnLst>
-      <p:par>
-        <p:cTn id="1" dur="indefinite" restart="never" nodeType="tmRoot"/>
-      </p:par>
-    </p:tnLst>
-  </p:timing>
+  <p:transition spd="med">
+    <p:fade/>
+  </p:transition>
 </p:sld>
 </file>
 
@@ -3824,6 +4032,30 @@
               <a:rPr lang="en-US" sz="2000" dirty="0" smtClean="0"/>
               <a:t>unit = .M1 or .M2</a:t>
             </a:r>
+          </a:p>
+        </p:txBody>
+      </p:sp>
+      <p:sp>
+        <p:nvSpPr>
+          <p:cNvPr id="4" name="Slide Number Placeholder 3"/>
+          <p:cNvSpPr>
+            <a:spLocks noGrp="1"/>
+          </p:cNvSpPr>
+          <p:nvPr>
+            <p:ph type="sldNum" sz="quarter" idx="4"/>
+          </p:nvPr>
+        </p:nvSpPr>
+        <p:spPr/>
+        <p:txBody>
+          <a:bodyPr/>
+          <a:lstStyle/>
+          <a:p>
+            <a:fld id="{F2394529-A9B3-4A54-83EC-E61379E8334E}" type="slidenum">
+              <a:rPr lang="en-US" smtClean="0"/>
+              <a:pPr/>
+              <a:t>17</a:t>
+            </a:fld>
+            <a:endParaRPr lang="en-US" dirty="0"/>
           </a:p>
         </p:txBody>
       </p:sp>
@@ -4199,6 +4431,30 @@
           </a:p>
         </p:txBody>
       </p:sp>
+      <p:sp>
+        <p:nvSpPr>
+          <p:cNvPr id="4" name="Slide Number Placeholder 3"/>
+          <p:cNvSpPr>
+            <a:spLocks noGrp="1"/>
+          </p:cNvSpPr>
+          <p:nvPr>
+            <p:ph type="sldNum" sz="quarter" idx="4"/>
+          </p:nvPr>
+        </p:nvSpPr>
+        <p:spPr/>
+        <p:txBody>
+          <a:bodyPr/>
+          <a:lstStyle/>
+          <a:p>
+            <a:fld id="{F2394529-A9B3-4A54-83EC-E61379E8334E}" type="slidenum">
+              <a:rPr lang="en-US" smtClean="0"/>
+              <a:pPr/>
+              <a:t>18</a:t>
+            </a:fld>
+            <a:endParaRPr lang="en-US" dirty="0"/>
+          </a:p>
+        </p:txBody>
+      </p:sp>
     </p:spTree>
     <p:custDataLst>
       <p:tags r:id="rId1"/>
@@ -4415,6 +4671,30 @@
           </a:p>
         </p:txBody>
       </p:sp>
+      <p:sp>
+        <p:nvSpPr>
+          <p:cNvPr id="4" name="Slide Number Placeholder 3"/>
+          <p:cNvSpPr>
+            <a:spLocks noGrp="1"/>
+          </p:cNvSpPr>
+          <p:nvPr>
+            <p:ph type="sldNum" sz="quarter" idx="4"/>
+          </p:nvPr>
+        </p:nvSpPr>
+        <p:spPr/>
+        <p:txBody>
+          <a:bodyPr/>
+          <a:lstStyle/>
+          <a:p>
+            <a:fld id="{F2394529-A9B3-4A54-83EC-E61379E8334E}" type="slidenum">
+              <a:rPr lang="en-US" smtClean="0"/>
+              <a:pPr/>
+              <a:t>19</a:t>
+            </a:fld>
+            <a:endParaRPr lang="en-US" dirty="0"/>
+          </a:p>
+        </p:txBody>
+      </p:sp>
     </p:spTree>
     <p:custDataLst>
       <p:tags r:id="rId1"/>
@@ -4529,6 +4809,30 @@
           </a:p>
         </p:txBody>
       </p:sp>
+      <p:sp>
+        <p:nvSpPr>
+          <p:cNvPr id="4" name="Slide Number Placeholder 3"/>
+          <p:cNvSpPr>
+            <a:spLocks noGrp="1"/>
+          </p:cNvSpPr>
+          <p:nvPr>
+            <p:ph type="sldNum" sz="quarter" idx="4"/>
+          </p:nvPr>
+        </p:nvSpPr>
+        <p:spPr/>
+        <p:txBody>
+          <a:bodyPr/>
+          <a:lstStyle/>
+          <a:p>
+            <a:fld id="{F2394529-A9B3-4A54-83EC-E61379E8334E}" type="slidenum">
+              <a:rPr lang="en-US" smtClean="0"/>
+              <a:pPr/>
+              <a:t>2</a:t>
+            </a:fld>
+            <a:endParaRPr lang="en-US" dirty="0"/>
+          </a:p>
+        </p:txBody>
+      </p:sp>
     </p:spTree>
   </p:cSld>
   <p:clrMapOvr>
@@ -4568,132 +4872,49 @@
             <a:spLocks noGrp="1"/>
           </p:cNvSpPr>
           <p:nvPr>
-            <p:ph type="title"/>
+            <p:ph type="ctrTitle"/>
           </p:nvPr>
         </p:nvSpPr>
-        <p:spPr>
-          <a:xfrm>
-            <a:off x="152400" y="76200"/>
-            <a:ext cx="8839200" cy="762000"/>
-          </a:xfrm>
-        </p:spPr>
+        <p:spPr/>
         <p:txBody>
-          <a:bodyPr>
-            <a:normAutofit/>
-          </a:bodyPr>
+          <a:bodyPr/>
           <a:lstStyle/>
           <a:p>
             <a:r>
-              <a:rPr lang="en-US" sz="4000" dirty="0" smtClean="0"/>
-              <a:t>C66x CorePac Features: Memory Access</a:t>
+              <a:rPr lang="en-US" dirty="0" smtClean="0"/>
+              <a:t>C66x CorePac Features:</a:t>
             </a:r>
+            <a:br>
+              <a:rPr lang="en-US" dirty="0" smtClean="0"/>
+            </a:br>
+            <a:r>
+              <a:rPr lang="en-US" dirty="0" smtClean="0"/>
+              <a:t>Memory Access</a:t>
+            </a:r>
+            <a:endParaRPr lang="en-US" dirty="0"/>
           </a:p>
         </p:txBody>
       </p:sp>
       <p:sp>
         <p:nvSpPr>
-          <p:cNvPr id="3" name="Content Placeholder 2"/>
+          <p:cNvPr id="3" name="Subtitle 2"/>
           <p:cNvSpPr>
             <a:spLocks noGrp="1"/>
           </p:cNvSpPr>
           <p:nvPr>
-            <p:ph idx="1"/>
+            <p:ph type="subTitle" idx="1"/>
           </p:nvPr>
         </p:nvSpPr>
-        <p:spPr>
-          <a:noFill/>
-          <a:ln>
-            <a:noFill/>
-          </a:ln>
-        </p:spPr>
+        <p:spPr/>
         <p:txBody>
-          <a:bodyPr>
-            <a:normAutofit lnSpcReduction="10000"/>
-          </a:bodyPr>
+          <a:bodyPr/>
           <a:lstStyle/>
           <a:p>
             <a:r>
               <a:rPr lang="en-US" dirty="0" smtClean="0"/>
-              <a:t>C66x CorePac in KeyStone</a:t>
+              <a:t>C66x CorePac Overview</a:t>
             </a:r>
-          </a:p>
-          <a:p>
-            <a:r>
-              <a:rPr lang="en-US" b="1" dirty="0" smtClean="0"/>
-              <a:t>C66x CorePac Features</a:t>
-            </a:r>
-          </a:p>
-          <a:p>
-            <a:pPr marL="811213" lvl="1" indent="-514350" eaLnBrk="1" fontAlgn="auto" hangingPunct="1">
-              <a:spcAft>
-                <a:spcPts val="0"/>
-              </a:spcAft>
-              <a:defRPr/>
-            </a:pPr>
-            <a:r>
-              <a:rPr lang="en-US" dirty="0" smtClean="0"/>
-              <a:t>DSP Core Architecture</a:t>
-            </a:r>
-          </a:p>
-          <a:p>
-            <a:pPr marL="811213" lvl="1" indent="-514350" eaLnBrk="1" fontAlgn="auto" hangingPunct="1">
-              <a:spcAft>
-                <a:spcPts val="0"/>
-              </a:spcAft>
-              <a:defRPr/>
-            </a:pPr>
-            <a:r>
-              <a:rPr lang="en-US" dirty="0" smtClean="0"/>
-              <a:t>Single Instruction Multiple Data (SIMD)</a:t>
-            </a:r>
-          </a:p>
-          <a:p>
-            <a:pPr marL="811213" lvl="1" indent="-514350" eaLnBrk="1" fontAlgn="auto" hangingPunct="1">
-              <a:spcAft>
-                <a:spcPts val="0"/>
-              </a:spcAft>
-              <a:defRPr/>
-            </a:pPr>
-            <a:r>
-              <a:rPr lang="en-US" b="1" dirty="0" smtClean="0"/>
-              <a:t>Memory Access </a:t>
-            </a:r>
-          </a:p>
-          <a:p>
-            <a:pPr marL="811213" lvl="1" indent="-514350" eaLnBrk="1" fontAlgn="auto" hangingPunct="1">
-              <a:spcAft>
-                <a:spcPts val="0"/>
-              </a:spcAft>
-              <a:defRPr/>
-            </a:pPr>
-            <a:r>
-              <a:rPr lang="en-US" dirty="0" smtClean="0"/>
-              <a:t>Pipeline Support</a:t>
-            </a:r>
-          </a:p>
-          <a:p>
-            <a:r>
-              <a:rPr lang="en-US" dirty="0" smtClean="0"/>
-              <a:t>Interface to the SOC</a:t>
-            </a:r>
-          </a:p>
-          <a:p>
-            <a:r>
-              <a:rPr lang="en-US" dirty="0" smtClean="0"/>
-              <a:t>Interrupt Controller</a:t>
-            </a:r>
-          </a:p>
-          <a:p>
-            <a:r>
-              <a:rPr lang="en-US" dirty="0" smtClean="0"/>
-              <a:t>Power Management</a:t>
-            </a:r>
-          </a:p>
-          <a:p>
-            <a:r>
-              <a:rPr lang="en-US" dirty="0" smtClean="0"/>
-              <a:t>Debug and Trace</a:t>
-            </a:r>
+            <a:endParaRPr lang="en-US" dirty="0"/>
           </a:p>
         </p:txBody>
       </p:sp>
@@ -4702,13 +4923,9 @@
   <p:clrMapOvr>
     <a:masterClrMapping/>
   </p:clrMapOvr>
-  <p:timing>
-    <p:tnLst>
-      <p:par>
-        <p:cTn id="1" dur="indefinite" restart="never" nodeType="tmRoot"/>
-      </p:par>
-    </p:tnLst>
-  </p:timing>
+  <p:transition spd="med">
+    <p:fade/>
+  </p:transition>
 </p:sld>
 </file>
 
@@ -6645,6 +6862,30 @@
           </a:p>
         </p:txBody>
       </p:sp>
+      <p:sp>
+        <p:nvSpPr>
+          <p:cNvPr id="43" name="Slide Number Placeholder 42"/>
+          <p:cNvSpPr>
+            <a:spLocks noGrp="1"/>
+          </p:cNvSpPr>
+          <p:nvPr>
+            <p:ph type="sldNum" sz="quarter" idx="4"/>
+          </p:nvPr>
+        </p:nvSpPr>
+        <p:spPr/>
+        <p:txBody>
+          <a:bodyPr/>
+          <a:lstStyle/>
+          <a:p>
+            <a:fld id="{F2394529-A9B3-4A54-83EC-E61379E8334E}" type="slidenum">
+              <a:rPr lang="en-US" smtClean="0"/>
+              <a:pPr/>
+              <a:t>21</a:t>
+            </a:fld>
+            <a:endParaRPr lang="en-US" dirty="0"/>
+          </a:p>
+        </p:txBody>
+      </p:sp>
     </p:spTree>
     <p:custDataLst>
       <p:tags r:id="rId1"/>
@@ -7118,6 +7359,30 @@
           </a:graphicData>
         </a:graphic>
       </p:graphicFrame>
+      <p:sp>
+        <p:nvSpPr>
+          <p:cNvPr id="5" name="Slide Number Placeholder 4"/>
+          <p:cNvSpPr>
+            <a:spLocks noGrp="1"/>
+          </p:cNvSpPr>
+          <p:nvPr>
+            <p:ph type="sldNum" sz="quarter" idx="4"/>
+          </p:nvPr>
+        </p:nvSpPr>
+        <p:spPr/>
+        <p:txBody>
+          <a:bodyPr/>
+          <a:lstStyle/>
+          <a:p>
+            <a:fld id="{F2394529-A9B3-4A54-83EC-E61379E8334E}" type="slidenum">
+              <a:rPr lang="en-US" smtClean="0"/>
+              <a:pPr/>
+              <a:t>22</a:t>
+            </a:fld>
+            <a:endParaRPr lang="en-US" dirty="0"/>
+          </a:p>
+        </p:txBody>
+      </p:sp>
     </p:spTree>
   </p:cSld>
   <p:clrMapOvr>
@@ -7285,6 +7550,30 @@
           </a:p>
         </p:txBody>
       </p:sp>
+      <p:sp>
+        <p:nvSpPr>
+          <p:cNvPr id="4" name="Slide Number Placeholder 3"/>
+          <p:cNvSpPr>
+            <a:spLocks noGrp="1"/>
+          </p:cNvSpPr>
+          <p:nvPr>
+            <p:ph type="sldNum" sz="quarter" idx="4"/>
+          </p:nvPr>
+        </p:nvSpPr>
+        <p:spPr/>
+        <p:txBody>
+          <a:bodyPr/>
+          <a:lstStyle/>
+          <a:p>
+            <a:fld id="{F2394529-A9B3-4A54-83EC-E61379E8334E}" type="slidenum">
+              <a:rPr lang="en-US" smtClean="0"/>
+              <a:pPr/>
+              <a:t>23</a:t>
+            </a:fld>
+            <a:endParaRPr lang="en-US" dirty="0"/>
+          </a:p>
+        </p:txBody>
+      </p:sp>
     </p:spTree>
   </p:cSld>
   <p:clrMapOvr>
@@ -7405,6 +7694,30 @@
           </a:p>
         </p:txBody>
       </p:sp>
+      <p:sp>
+        <p:nvSpPr>
+          <p:cNvPr id="4" name="Slide Number Placeholder 3"/>
+          <p:cNvSpPr>
+            <a:spLocks noGrp="1"/>
+          </p:cNvSpPr>
+          <p:nvPr>
+            <p:ph type="sldNum" sz="quarter" idx="4"/>
+          </p:nvPr>
+        </p:nvSpPr>
+        <p:spPr/>
+        <p:txBody>
+          <a:bodyPr/>
+          <a:lstStyle/>
+          <a:p>
+            <a:fld id="{F2394529-A9B3-4A54-83EC-E61379E8334E}" type="slidenum">
+              <a:rPr lang="en-US" smtClean="0"/>
+              <a:pPr/>
+              <a:t>24</a:t>
+            </a:fld>
+            <a:endParaRPr lang="en-US" dirty="0"/>
+          </a:p>
+        </p:txBody>
+      </p:sp>
     </p:spTree>
   </p:cSld>
   <p:clrMapOvr>
@@ -7444,132 +7757,49 @@
             <a:spLocks noGrp="1"/>
           </p:cNvSpPr>
           <p:nvPr>
-            <p:ph type="title"/>
+            <p:ph type="ctrTitle"/>
           </p:nvPr>
         </p:nvSpPr>
-        <p:spPr>
-          <a:xfrm>
-            <a:off x="152400" y="76200"/>
-            <a:ext cx="8839200" cy="762000"/>
-          </a:xfrm>
-        </p:spPr>
+        <p:spPr/>
         <p:txBody>
-          <a:bodyPr>
-            <a:noAutofit/>
-          </a:bodyPr>
+          <a:bodyPr/>
           <a:lstStyle/>
           <a:p>
             <a:r>
-              <a:rPr lang="en-US" sz="4000" dirty="0" smtClean="0"/>
-              <a:t>C66x CorePac Features: Pipeline Support</a:t>
+              <a:rPr lang="en-US" dirty="0" smtClean="0"/>
+              <a:t>C66x CorePac Features:</a:t>
             </a:r>
+            <a:br>
+              <a:rPr lang="en-US" dirty="0" smtClean="0"/>
+            </a:br>
+            <a:r>
+              <a:rPr lang="en-US" dirty="0" smtClean="0"/>
+              <a:t>Pipeline Support</a:t>
+            </a:r>
+            <a:endParaRPr lang="en-US" dirty="0"/>
           </a:p>
         </p:txBody>
       </p:sp>
       <p:sp>
         <p:nvSpPr>
-          <p:cNvPr id="3" name="Content Placeholder 2"/>
+          <p:cNvPr id="3" name="Subtitle 2"/>
           <p:cNvSpPr>
             <a:spLocks noGrp="1"/>
           </p:cNvSpPr>
           <p:nvPr>
-            <p:ph idx="1"/>
+            <p:ph type="subTitle" idx="1"/>
           </p:nvPr>
         </p:nvSpPr>
-        <p:spPr>
-          <a:noFill/>
-          <a:ln>
-            <a:noFill/>
-          </a:ln>
-        </p:spPr>
+        <p:spPr/>
         <p:txBody>
-          <a:bodyPr>
-            <a:normAutofit lnSpcReduction="10000"/>
-          </a:bodyPr>
+          <a:bodyPr/>
           <a:lstStyle/>
           <a:p>
             <a:r>
               <a:rPr lang="en-US" dirty="0" smtClean="0"/>
-              <a:t>C66x CorePac in KeyStone</a:t>
+              <a:t>C66x CorePac Overview</a:t>
             </a:r>
-          </a:p>
-          <a:p>
-            <a:r>
-              <a:rPr lang="en-US" b="1" dirty="0" smtClean="0"/>
-              <a:t>C66x CorePac Features</a:t>
-            </a:r>
-          </a:p>
-          <a:p>
-            <a:pPr marL="811213" lvl="1" indent="-514350" eaLnBrk="1" fontAlgn="auto" hangingPunct="1">
-              <a:spcAft>
-                <a:spcPts val="0"/>
-              </a:spcAft>
-              <a:defRPr/>
-            </a:pPr>
-            <a:r>
-              <a:rPr lang="en-US" dirty="0" smtClean="0"/>
-              <a:t>DSP Core Architecture</a:t>
-            </a:r>
-          </a:p>
-          <a:p>
-            <a:pPr marL="811213" lvl="1" indent="-514350" eaLnBrk="1" fontAlgn="auto" hangingPunct="1">
-              <a:spcAft>
-                <a:spcPts val="0"/>
-              </a:spcAft>
-              <a:defRPr/>
-            </a:pPr>
-            <a:r>
-              <a:rPr lang="en-US" dirty="0" smtClean="0"/>
-              <a:t>Single Instruction Multiple Data (SIMD)</a:t>
-            </a:r>
-          </a:p>
-          <a:p>
-            <a:pPr marL="811213" lvl="1" indent="-514350" eaLnBrk="1" fontAlgn="auto" hangingPunct="1">
-              <a:spcAft>
-                <a:spcPts val="0"/>
-              </a:spcAft>
-              <a:defRPr/>
-            </a:pPr>
-            <a:r>
-              <a:rPr lang="en-US" dirty="0" smtClean="0"/>
-              <a:t>Memory Access </a:t>
-            </a:r>
-          </a:p>
-          <a:p>
-            <a:pPr marL="811213" lvl="1" indent="-514350" eaLnBrk="1" fontAlgn="auto" hangingPunct="1">
-              <a:spcAft>
-                <a:spcPts val="0"/>
-              </a:spcAft>
-              <a:defRPr/>
-            </a:pPr>
-            <a:r>
-              <a:rPr lang="en-US" b="1" dirty="0" smtClean="0"/>
-              <a:t>Pipeline Support</a:t>
-            </a:r>
-          </a:p>
-          <a:p>
-            <a:r>
-              <a:rPr lang="en-US" dirty="0" smtClean="0"/>
-              <a:t>Interface to the SOC</a:t>
-            </a:r>
-          </a:p>
-          <a:p>
-            <a:r>
-              <a:rPr lang="en-US" dirty="0" smtClean="0"/>
-              <a:t>Interrupt Controller</a:t>
-            </a:r>
-          </a:p>
-          <a:p>
-            <a:r>
-              <a:rPr lang="en-US" dirty="0" smtClean="0"/>
-              <a:t>Power Management</a:t>
-            </a:r>
-          </a:p>
-          <a:p>
-            <a:r>
-              <a:rPr lang="en-US" dirty="0" smtClean="0"/>
-              <a:t>Debug and Trace</a:t>
-            </a:r>
+            <a:endParaRPr lang="en-US" dirty="0"/>
           </a:p>
         </p:txBody>
       </p:sp>
@@ -7578,13 +7808,9 @@
   <p:clrMapOvr>
     <a:masterClrMapping/>
   </p:clrMapOvr>
-  <p:timing>
-    <p:tnLst>
-      <p:par>
-        <p:cTn id="1" dur="indefinite" restart="never" nodeType="tmRoot"/>
-      </p:par>
-    </p:tnLst>
-  </p:timing>
+  <p:transition spd="med">
+    <p:fade/>
+  </p:transition>
 </p:sld>
 </file>
 
@@ -7796,6 +8022,30 @@
           </a:p>
         </p:txBody>
       </p:sp>
+      <p:sp>
+        <p:nvSpPr>
+          <p:cNvPr id="4" name="Slide Number Placeholder 3"/>
+          <p:cNvSpPr>
+            <a:spLocks noGrp="1"/>
+          </p:cNvSpPr>
+          <p:nvPr>
+            <p:ph type="sldNum" sz="quarter" idx="4"/>
+          </p:nvPr>
+        </p:nvSpPr>
+        <p:spPr/>
+        <p:txBody>
+          <a:bodyPr/>
+          <a:lstStyle/>
+          <a:p>
+            <a:fld id="{F2394529-A9B3-4A54-83EC-E61379E8334E}" type="slidenum">
+              <a:rPr lang="en-US" smtClean="0"/>
+              <a:pPr/>
+              <a:t>26</a:t>
+            </a:fld>
+            <a:endParaRPr lang="en-US" dirty="0"/>
+          </a:p>
+        </p:txBody>
+      </p:sp>
     </p:spTree>
     <p:custDataLst>
       <p:tags r:id="rId1"/>
@@ -7838,127 +8088,42 @@
             <a:spLocks noGrp="1"/>
           </p:cNvSpPr>
           <p:nvPr>
-            <p:ph type="title"/>
+            <p:ph type="ctrTitle"/>
           </p:nvPr>
         </p:nvSpPr>
         <p:spPr/>
         <p:txBody>
-          <a:bodyPr>
-            <a:normAutofit/>
-          </a:bodyPr>
+          <a:bodyPr/>
           <a:lstStyle/>
           <a:p>
             <a:r>
               <a:rPr lang="en-US" dirty="0" smtClean="0"/>
               <a:t>Interface to the SOC</a:t>
             </a:r>
+            <a:endParaRPr lang="en-US" dirty="0"/>
           </a:p>
         </p:txBody>
       </p:sp>
       <p:sp>
         <p:nvSpPr>
-          <p:cNvPr id="3" name="Content Placeholder 2"/>
+          <p:cNvPr id="3" name="Subtitle 2"/>
           <p:cNvSpPr>
             <a:spLocks noGrp="1"/>
           </p:cNvSpPr>
           <p:nvPr>
-            <p:ph idx="1"/>
+            <p:ph type="subTitle" idx="1"/>
           </p:nvPr>
         </p:nvSpPr>
-        <p:spPr>
-          <a:noFill/>
-          <a:ln>
-            <a:noFill/>
-          </a:ln>
-        </p:spPr>
+        <p:spPr/>
         <p:txBody>
-          <a:bodyPr>
-            <a:normAutofit lnSpcReduction="10000"/>
-          </a:bodyPr>
+          <a:bodyPr/>
           <a:lstStyle/>
           <a:p>
             <a:r>
               <a:rPr lang="en-US" dirty="0" smtClean="0"/>
-              <a:t>C66x CorePac in KeyStone</a:t>
+              <a:t>C66x CorePac Overview</a:t>
             </a:r>
-          </a:p>
-          <a:p>
-            <a:r>
-              <a:rPr lang="en-US" dirty="0" smtClean="0"/>
-              <a:t>C66x CorePac Features</a:t>
-            </a:r>
-          </a:p>
-          <a:p>
-            <a:pPr marL="811213" lvl="1" indent="-514350" eaLnBrk="1" fontAlgn="auto" hangingPunct="1">
-              <a:spcAft>
-                <a:spcPts val="0"/>
-              </a:spcAft>
-              <a:defRPr/>
-            </a:pPr>
-            <a:r>
-              <a:rPr lang="en-US" dirty="0" smtClean="0"/>
-              <a:t>DSP Core Architecture</a:t>
-            </a:r>
-          </a:p>
-          <a:p>
-            <a:pPr marL="811213" lvl="1" indent="-514350" eaLnBrk="1" fontAlgn="auto" hangingPunct="1">
-              <a:spcAft>
-                <a:spcPts val="0"/>
-              </a:spcAft>
-              <a:defRPr/>
-            </a:pPr>
-            <a:r>
-              <a:rPr lang="en-US" dirty="0" smtClean="0"/>
-              <a:t>Single Instruction Multiple Data (SIMD)</a:t>
-            </a:r>
-          </a:p>
-          <a:p>
-            <a:pPr marL="811213" lvl="1" indent="-514350" eaLnBrk="1" fontAlgn="auto" hangingPunct="1">
-              <a:spcAft>
-                <a:spcPts val="0"/>
-              </a:spcAft>
-              <a:defRPr/>
-            </a:pPr>
-            <a:r>
-              <a:rPr lang="en-US" dirty="0" smtClean="0"/>
-              <a:t>Memory Access </a:t>
-            </a:r>
-          </a:p>
-          <a:p>
-            <a:pPr marL="811213" lvl="1" indent="-514350" eaLnBrk="1" fontAlgn="auto" hangingPunct="1">
-              <a:spcAft>
-                <a:spcPts val="0"/>
-              </a:spcAft>
-              <a:defRPr/>
-            </a:pPr>
-            <a:r>
-              <a:rPr lang="en-US" dirty="0" smtClean="0"/>
-              <a:t>Pipeline Support</a:t>
-            </a:r>
-          </a:p>
-          <a:p>
-            <a:r>
-              <a:rPr lang="en-US" b="1" dirty="0" smtClean="0"/>
-              <a:t>Interface to the SOC</a:t>
-            </a:r>
-          </a:p>
-          <a:p>
-            <a:r>
-              <a:rPr lang="en-US" dirty="0" smtClean="0"/>
-              <a:t>Interrupt Controller</a:t>
-            </a:r>
-          </a:p>
-          <a:p>
-            <a:r>
-              <a:rPr lang="en-US" dirty="0" smtClean="0"/>
-              <a:t>Power Management</a:t>
-            </a:r>
-          </a:p>
-          <a:p>
-            <a:r>
-              <a:rPr lang="en-US" dirty="0" smtClean="0"/>
-              <a:t>Debug and Trace</a:t>
-            </a:r>
+            <a:endParaRPr lang="en-US" dirty="0"/>
           </a:p>
         </p:txBody>
       </p:sp>
@@ -7967,13 +8132,9 @@
   <p:clrMapOvr>
     <a:masterClrMapping/>
   </p:clrMapOvr>
-  <p:timing>
-    <p:tnLst>
-      <p:par>
-        <p:cTn id="1" dur="indefinite" restart="never" nodeType="tmRoot"/>
-      </p:par>
-    </p:tnLst>
-  </p:timing>
+  <p:transition spd="med">
+    <p:fade/>
+  </p:transition>
 </p:sld>
 </file>
 
@@ -8011,7 +8172,7 @@
         </p:blipFill>
         <p:spPr bwMode="auto">
           <a:xfrm>
-            <a:off x="393770" y="914400"/>
+            <a:off x="393770" y="806604"/>
             <a:ext cx="5016430" cy="5493829"/>
           </a:xfrm>
           <a:prstGeom prst="rect">
@@ -8070,7 +8231,7 @@
                   <a:noFill/>
                 </a:ln>
                 <a:solidFill>
-                  <a:schemeClr val="tx1"/>
+                  <a:srgbClr val="DE0000"/>
                 </a:solidFill>
                 <a:effectLst/>
                 <a:uLnTx/>
@@ -8362,6 +8523,30 @@
           </a:p>
         </p:txBody>
       </p:sp>
+      <p:sp>
+        <p:nvSpPr>
+          <p:cNvPr id="7" name="Slide Number Placeholder 6"/>
+          <p:cNvSpPr>
+            <a:spLocks noGrp="1"/>
+          </p:cNvSpPr>
+          <p:nvPr>
+            <p:ph type="sldNum" sz="quarter" idx="4"/>
+          </p:nvPr>
+        </p:nvSpPr>
+        <p:spPr/>
+        <p:txBody>
+          <a:bodyPr/>
+          <a:lstStyle/>
+          <a:p>
+            <a:fld id="{F2394529-A9B3-4A54-83EC-E61379E8334E}" type="slidenum">
+              <a:rPr lang="en-US" smtClean="0"/>
+              <a:pPr/>
+              <a:t>28</a:t>
+            </a:fld>
+            <a:endParaRPr lang="en-US" dirty="0"/>
+          </a:p>
+        </p:txBody>
+      </p:sp>
     </p:spTree>
   </p:cSld>
   <p:clrMapOvr>
@@ -8396,14 +8581,14 @@
       </p:grpSpPr>
       <p:sp>
         <p:nvSpPr>
-          <p:cNvPr id="82" name="TextBox 81"/>
+          <p:cNvPr id="70" name="TextBox 69"/>
           <p:cNvSpPr txBox="1"/>
           <p:nvPr/>
         </p:nvSpPr>
         <p:spPr>
           <a:xfrm>
-            <a:off x="304800" y="6477000"/>
-            <a:ext cx="8839200" cy="381000"/>
+            <a:off x="0" y="6309732"/>
+            <a:ext cx="8991600" cy="505004"/>
           </a:xfrm>
           <a:prstGeom prst="rect">
             <a:avLst/>
@@ -8414,7 +8599,7 @@
         </p:spPr>
         <p:txBody>
           <a:bodyPr wrap="square" rtlCol="0">
-            <a:spAutoFit/>
+            <a:noAutofit/>
           </a:bodyPr>
           <a:lstStyle/>
           <a:p>
@@ -10901,74 +11086,42 @@
             <a:spLocks noGrp="1"/>
           </p:cNvSpPr>
           <p:nvPr>
-            <p:ph type="title"/>
+            <p:ph type="ctrTitle"/>
           </p:nvPr>
         </p:nvSpPr>
         <p:spPr/>
         <p:txBody>
-          <a:bodyPr>
-            <a:normAutofit/>
-          </a:bodyPr>
+          <a:bodyPr/>
           <a:lstStyle/>
           <a:p>
             <a:r>
               <a:rPr lang="en-US" dirty="0" smtClean="0"/>
               <a:t>C66x CorePac in KeyStone</a:t>
             </a:r>
+            <a:endParaRPr lang="en-US" dirty="0"/>
           </a:p>
         </p:txBody>
       </p:sp>
       <p:sp>
         <p:nvSpPr>
-          <p:cNvPr id="3" name="Content Placeholder 2"/>
+          <p:cNvPr id="3" name="Subtitle 2"/>
           <p:cNvSpPr>
             <a:spLocks noGrp="1"/>
           </p:cNvSpPr>
           <p:nvPr>
-            <p:ph idx="1"/>
+            <p:ph type="subTitle" idx="1"/>
           </p:nvPr>
         </p:nvSpPr>
         <p:spPr/>
         <p:txBody>
-          <a:bodyPr>
-            <a:normAutofit/>
-          </a:bodyPr>
+          <a:bodyPr/>
           <a:lstStyle/>
           <a:p>
             <a:r>
-              <a:rPr lang="en-US" b="1" dirty="0" smtClean="0"/>
-              <a:t>C66x CorePac in KeyStone</a:t>
+              <a:rPr lang="en-US" dirty="0" smtClean="0"/>
+              <a:t>C66x CorePac Overview</a:t>
             </a:r>
-          </a:p>
-          <a:p>
-            <a:r>
-              <a:rPr lang="en-US" dirty="0" smtClean="0"/>
-              <a:t>C66x CorePac Features</a:t>
-            </a:r>
-          </a:p>
-          <a:p>
-            <a:r>
-              <a:rPr lang="en-US" dirty="0" smtClean="0"/>
-              <a:t>Interface to the SOC</a:t>
-            </a:r>
-          </a:p>
-          <a:p>
-            <a:r>
-              <a:rPr lang="en-US" dirty="0" smtClean="0"/>
-              <a:t>Interrupt Controller</a:t>
-            </a:r>
-          </a:p>
-          <a:p>
-            <a:r>
-              <a:rPr lang="en-US" dirty="0" smtClean="0"/>
-              <a:t>Power Management</a:t>
-            </a:r>
-          </a:p>
-          <a:p>
-            <a:r>
-              <a:rPr lang="en-US" dirty="0" smtClean="0"/>
-              <a:t>Debug and Trace</a:t>
-            </a:r>
+            <a:endParaRPr lang="en-US" dirty="0"/>
           </a:p>
         </p:txBody>
       </p:sp>
@@ -10977,13 +11130,9 @@
   <p:clrMapOvr>
     <a:masterClrMapping/>
   </p:clrMapOvr>
-  <p:timing>
-    <p:tnLst>
-      <p:par>
-        <p:cTn id="1" dur="indefinite" restart="never" nodeType="tmRoot"/>
-      </p:par>
-    </p:tnLst>
-  </p:timing>
+  <p:transition spd="med">
+    <p:fade/>
+  </p:transition>
 </p:sld>
 </file>
 
@@ -11011,14 +11160,12 @@
             <a:spLocks noGrp="1"/>
           </p:cNvSpPr>
           <p:nvPr>
-            <p:ph type="title"/>
+            <p:ph type="ctrTitle"/>
           </p:nvPr>
         </p:nvSpPr>
         <p:spPr/>
         <p:txBody>
-          <a:bodyPr>
-            <a:normAutofit/>
-          </a:bodyPr>
+          <a:bodyPr/>
           <a:lstStyle/>
           <a:p>
             <a:r>
@@ -11031,108 +11178,24 @@
       </p:sp>
       <p:sp>
         <p:nvSpPr>
-          <p:cNvPr id="3" name="Content Placeholder 2"/>
+          <p:cNvPr id="3" name="Subtitle 2"/>
           <p:cNvSpPr>
             <a:spLocks noGrp="1"/>
           </p:cNvSpPr>
           <p:nvPr>
-            <p:ph idx="1"/>
+            <p:ph type="subTitle" idx="1"/>
           </p:nvPr>
         </p:nvSpPr>
-        <p:spPr>
-          <a:noFill/>
-          <a:ln>
-            <a:noFill/>
-          </a:ln>
-        </p:spPr>
+        <p:spPr/>
         <p:txBody>
-          <a:bodyPr>
-            <a:normAutofit lnSpcReduction="10000"/>
-          </a:bodyPr>
+          <a:bodyPr/>
           <a:lstStyle/>
           <a:p>
             <a:r>
               <a:rPr lang="en-US" dirty="0" smtClean="0"/>
-              <a:t>C66x CorePac in KeyStone</a:t>
+              <a:t>C66x CorePac Overview</a:t>
             </a:r>
-          </a:p>
-          <a:p>
-            <a:r>
-              <a:rPr lang="en-US" dirty="0" smtClean="0"/>
-              <a:t>C66x CorePac Features</a:t>
-            </a:r>
-          </a:p>
-          <a:p>
-            <a:pPr marL="811213" lvl="1" indent="-514350" eaLnBrk="1" fontAlgn="auto" hangingPunct="1">
-              <a:spcAft>
-                <a:spcPts val="0"/>
-              </a:spcAft>
-              <a:defRPr/>
-            </a:pPr>
-            <a:r>
-              <a:rPr lang="en-US" dirty="0" smtClean="0"/>
-              <a:t>DSP Core Architecture</a:t>
-            </a:r>
-          </a:p>
-          <a:p>
-            <a:pPr marL="811213" lvl="1" indent="-514350" eaLnBrk="1" fontAlgn="auto" hangingPunct="1">
-              <a:spcAft>
-                <a:spcPts val="0"/>
-              </a:spcAft>
-              <a:defRPr/>
-            </a:pPr>
-            <a:r>
-              <a:rPr lang="en-US" dirty="0" smtClean="0"/>
-              <a:t>Single Instruction Multiple Data (SIMD)</a:t>
-            </a:r>
-          </a:p>
-          <a:p>
-            <a:pPr marL="811213" lvl="1" indent="-514350" eaLnBrk="1" fontAlgn="auto" hangingPunct="1">
-              <a:spcAft>
-                <a:spcPts val="0"/>
-              </a:spcAft>
-              <a:defRPr/>
-            </a:pPr>
-            <a:r>
-              <a:rPr lang="en-US" dirty="0" smtClean="0"/>
-              <a:t>Memory Access </a:t>
-            </a:r>
-          </a:p>
-          <a:p>
-            <a:pPr marL="811213" lvl="1" indent="-514350" eaLnBrk="1" fontAlgn="auto" hangingPunct="1">
-              <a:spcAft>
-                <a:spcPts val="0"/>
-              </a:spcAft>
-              <a:defRPr/>
-            </a:pPr>
-            <a:r>
-              <a:rPr lang="en-US" dirty="0" smtClean="0"/>
-              <a:t>Pipeline Support</a:t>
-            </a:r>
-          </a:p>
-          <a:p>
-            <a:r>
-              <a:rPr lang="en-US" dirty="0" smtClean="0"/>
-              <a:t>Interface to the SOC</a:t>
-            </a:r>
-          </a:p>
-          <a:p>
-            <a:r>
-              <a:rPr lang="en-US" b="1" dirty="0" smtClean="0"/>
-              <a:t>Interrupt Controller</a:t>
-            </a:r>
-          </a:p>
-          <a:p>
-            <a:r>
-              <a:rPr lang="en-US" dirty="0" smtClean="0"/>
-              <a:t>Power Management</a:t>
-            </a:r>
-          </a:p>
-          <a:p>
-            <a:r>
-              <a:rPr lang="en-US" dirty="0" smtClean="0"/>
-              <a:t>Debug and Trace</a:t>
-            </a:r>
+            <a:endParaRPr lang="en-US" dirty="0"/>
           </a:p>
         </p:txBody>
       </p:sp>
@@ -11141,13 +11204,9 @@
   <p:clrMapOvr>
     <a:masterClrMapping/>
   </p:clrMapOvr>
-  <p:timing>
-    <p:tnLst>
-      <p:par>
-        <p:cTn id="1" dur="indefinite" restart="never" nodeType="tmRoot"/>
-      </p:par>
-    </p:tnLst>
-  </p:timing>
+  <p:transition spd="med">
+    <p:fade/>
+  </p:transition>
 </p:sld>
 </file>
 
@@ -11176,7 +11235,7 @@
         </p:nvSpPr>
         <p:spPr bwMode="auto">
           <a:xfrm>
-            <a:off x="5486400" y="3733800"/>
+            <a:off x="5486400" y="3505200"/>
             <a:ext cx="3276600" cy="1143000"/>
           </a:xfrm>
           <a:prstGeom prst="rect">
@@ -11273,7 +11332,7 @@
         </p:blipFill>
         <p:spPr bwMode="auto">
           <a:xfrm>
-            <a:off x="343661" y="1371599"/>
+            <a:off x="343661" y="1142999"/>
             <a:ext cx="4914139" cy="4985405"/>
           </a:xfrm>
           <a:prstGeom prst="rect">
@@ -11298,7 +11357,7 @@
         </p:nvSpPr>
         <p:spPr bwMode="auto">
           <a:xfrm>
-            <a:off x="5491168" y="1295400"/>
+            <a:off x="5491168" y="1066800"/>
             <a:ext cx="3271832" cy="4485219"/>
           </a:xfrm>
           <a:prstGeom prst="rect">
@@ -11501,6 +11560,30 @@
           </a:p>
         </p:txBody>
       </p:sp>
+      <p:sp>
+        <p:nvSpPr>
+          <p:cNvPr id="7" name="Slide Number Placeholder 6"/>
+          <p:cNvSpPr>
+            <a:spLocks noGrp="1"/>
+          </p:cNvSpPr>
+          <p:nvPr>
+            <p:ph type="sldNum" sz="quarter" idx="4"/>
+          </p:nvPr>
+        </p:nvSpPr>
+        <p:spPr/>
+        <p:txBody>
+          <a:bodyPr/>
+          <a:lstStyle/>
+          <a:p>
+            <a:fld id="{F2394529-A9B3-4A54-83EC-E61379E8334E}" type="slidenum">
+              <a:rPr lang="en-US" smtClean="0"/>
+              <a:pPr/>
+              <a:t>31</a:t>
+            </a:fld>
+            <a:endParaRPr lang="en-US" dirty="0"/>
+          </a:p>
+        </p:txBody>
+      </p:sp>
     </p:spTree>
   </p:cSld>
   <p:clrMapOvr>
@@ -11573,7 +11656,7 @@
         </p:blipFill>
         <p:spPr bwMode="auto">
           <a:xfrm>
-            <a:off x="958658" y="1083477"/>
+            <a:off x="958658" y="1046307"/>
             <a:ext cx="6204142" cy="2024046"/>
           </a:xfrm>
           <a:prstGeom prst="rect">
@@ -11605,7 +11688,7 @@
         </p:blipFill>
         <p:spPr bwMode="auto">
           <a:xfrm>
-            <a:off x="961864" y="3077736"/>
+            <a:off x="961864" y="3040566"/>
             <a:ext cx="5896136" cy="3267076"/>
           </a:xfrm>
           <a:prstGeom prst="rect">
@@ -11620,6 +11703,30 @@
           </a:ln>
         </p:spPr>
       </p:pic>
+      <p:sp>
+        <p:nvSpPr>
+          <p:cNvPr id="5" name="Slide Number Placeholder 4"/>
+          <p:cNvSpPr>
+            <a:spLocks noGrp="1"/>
+          </p:cNvSpPr>
+          <p:nvPr>
+            <p:ph type="sldNum" sz="quarter" idx="4"/>
+          </p:nvPr>
+        </p:nvSpPr>
+        <p:spPr/>
+        <p:txBody>
+          <a:bodyPr/>
+          <a:lstStyle/>
+          <a:p>
+            <a:fld id="{F2394529-A9B3-4A54-83EC-E61379E8334E}" type="slidenum">
+              <a:rPr lang="en-US" smtClean="0"/>
+              <a:pPr/>
+              <a:t>32</a:t>
+            </a:fld>
+            <a:endParaRPr lang="en-US" dirty="0"/>
+          </a:p>
+        </p:txBody>
+      </p:sp>
     </p:spTree>
   </p:cSld>
   <p:clrMapOvr>
@@ -11654,14 +11761,14 @@
       </p:grpSpPr>
       <p:sp>
         <p:nvSpPr>
-          <p:cNvPr id="4" name="TextBox 3"/>
+          <p:cNvPr id="5" name="TextBox 4"/>
           <p:cNvSpPr txBox="1"/>
           <p:nvPr/>
         </p:nvSpPr>
         <p:spPr>
           <a:xfrm>
-            <a:off x="228600" y="6460272"/>
-            <a:ext cx="8763000" cy="369332"/>
+            <a:off x="0" y="6309732"/>
+            <a:ext cx="8991600" cy="505004"/>
           </a:xfrm>
           <a:prstGeom prst="rect">
             <a:avLst/>
@@ -11672,7 +11779,7 @@
         </p:spPr>
         <p:txBody>
           <a:bodyPr wrap="square" rtlCol="0">
-            <a:spAutoFit/>
+            <a:noAutofit/>
           </a:bodyPr>
           <a:lstStyle/>
           <a:p>
@@ -11740,6 +11847,30 @@
           </a:p>
         </p:txBody>
       </p:sp>
+      <p:sp>
+        <p:nvSpPr>
+          <p:cNvPr id="6" name="Slide Number Placeholder 5"/>
+          <p:cNvSpPr>
+            <a:spLocks noGrp="1"/>
+          </p:cNvSpPr>
+          <p:nvPr>
+            <p:ph type="sldNum" sz="quarter" idx="4"/>
+          </p:nvPr>
+        </p:nvSpPr>
+        <p:spPr/>
+        <p:txBody>
+          <a:bodyPr/>
+          <a:lstStyle/>
+          <a:p>
+            <a:fld id="{F2394529-A9B3-4A54-83EC-E61379E8334E}" type="slidenum">
+              <a:rPr lang="en-US" smtClean="0"/>
+              <a:pPr/>
+              <a:t>33</a:t>
+            </a:fld>
+            <a:endParaRPr lang="en-US" dirty="0"/>
+          </a:p>
+        </p:txBody>
+      </p:sp>
     </p:spTree>
   </p:cSld>
   <p:clrMapOvr>
@@ -11779,127 +11910,42 @@
             <a:spLocks noGrp="1"/>
           </p:cNvSpPr>
           <p:nvPr>
-            <p:ph type="title"/>
+            <p:ph type="ctrTitle"/>
           </p:nvPr>
         </p:nvSpPr>
         <p:spPr/>
         <p:txBody>
-          <a:bodyPr>
-            <a:normAutofit/>
-          </a:bodyPr>
+          <a:bodyPr/>
           <a:lstStyle/>
           <a:p>
             <a:r>
               <a:rPr lang="en-US" dirty="0" smtClean="0"/>
-              <a:t>Power Management</a:t>
+              <a:t>Debug and Trace</a:t>
             </a:r>
+            <a:endParaRPr lang="en-US" dirty="0"/>
           </a:p>
         </p:txBody>
       </p:sp>
       <p:sp>
         <p:nvSpPr>
-          <p:cNvPr id="3" name="Content Placeholder 2"/>
+          <p:cNvPr id="3" name="Subtitle 2"/>
           <p:cNvSpPr>
             <a:spLocks noGrp="1"/>
           </p:cNvSpPr>
           <p:nvPr>
-            <p:ph idx="1"/>
+            <p:ph type="subTitle" idx="1"/>
           </p:nvPr>
         </p:nvSpPr>
-        <p:spPr>
-          <a:noFill/>
-          <a:ln>
-            <a:noFill/>
-          </a:ln>
-        </p:spPr>
+        <p:spPr/>
         <p:txBody>
-          <a:bodyPr>
-            <a:normAutofit lnSpcReduction="10000"/>
-          </a:bodyPr>
+          <a:bodyPr/>
           <a:lstStyle/>
           <a:p>
             <a:r>
               <a:rPr lang="en-US" dirty="0" smtClean="0"/>
-              <a:t>C66x CorePac in KeyStone</a:t>
+              <a:t>C66x CorePac Overview</a:t>
             </a:r>
-          </a:p>
-          <a:p>
-            <a:r>
-              <a:rPr lang="en-US" dirty="0" smtClean="0"/>
-              <a:t>C66x CorePac Features</a:t>
-            </a:r>
-          </a:p>
-          <a:p>
-            <a:pPr marL="811213" lvl="1" indent="-514350" eaLnBrk="1" fontAlgn="auto" hangingPunct="1">
-              <a:spcAft>
-                <a:spcPts val="0"/>
-              </a:spcAft>
-              <a:defRPr/>
-            </a:pPr>
-            <a:r>
-              <a:rPr lang="en-US" dirty="0" smtClean="0"/>
-              <a:t>DSP Core Architecture</a:t>
-            </a:r>
-          </a:p>
-          <a:p>
-            <a:pPr marL="811213" lvl="1" indent="-514350" eaLnBrk="1" fontAlgn="auto" hangingPunct="1">
-              <a:spcAft>
-                <a:spcPts val="0"/>
-              </a:spcAft>
-              <a:defRPr/>
-            </a:pPr>
-            <a:r>
-              <a:rPr lang="en-US" dirty="0" smtClean="0"/>
-              <a:t>Single Instruction Multiple Data (SIMD)</a:t>
-            </a:r>
-          </a:p>
-          <a:p>
-            <a:pPr marL="811213" lvl="1" indent="-514350" eaLnBrk="1" fontAlgn="auto" hangingPunct="1">
-              <a:spcAft>
-                <a:spcPts val="0"/>
-              </a:spcAft>
-              <a:defRPr/>
-            </a:pPr>
-            <a:r>
-              <a:rPr lang="en-US" dirty="0" smtClean="0"/>
-              <a:t>Memory Access </a:t>
-            </a:r>
-          </a:p>
-          <a:p>
-            <a:pPr marL="811213" lvl="1" indent="-514350" eaLnBrk="1" fontAlgn="auto" hangingPunct="1">
-              <a:spcAft>
-                <a:spcPts val="0"/>
-              </a:spcAft>
-              <a:defRPr/>
-            </a:pPr>
-            <a:r>
-              <a:rPr lang="en-US" dirty="0" smtClean="0"/>
-              <a:t>Pipeline Support</a:t>
-            </a:r>
-          </a:p>
-          <a:p>
-            <a:r>
-              <a:rPr lang="en-US" dirty="0" smtClean="0"/>
-              <a:t>Interface to the SOC</a:t>
-            </a:r>
-          </a:p>
-          <a:p>
-            <a:r>
-              <a:rPr lang="en-US" dirty="0" smtClean="0"/>
-              <a:t>Interrupt Controller</a:t>
-            </a:r>
-          </a:p>
-          <a:p>
-            <a:r>
-              <a:rPr lang="en-US" b="1" dirty="0" smtClean="0"/>
-              <a:t>Power Management</a:t>
-            </a:r>
-          </a:p>
-          <a:p>
-            <a:r>
-              <a:rPr lang="en-US" dirty="0" smtClean="0"/>
-              <a:t>Debug and Trace</a:t>
-            </a:r>
+            <a:endParaRPr lang="en-US" dirty="0"/>
           </a:p>
         </p:txBody>
       </p:sp>
@@ -11908,13 +11954,9 @@
   <p:clrMapOvr>
     <a:masterClrMapping/>
   </p:clrMapOvr>
-  <p:timing>
-    <p:tnLst>
-      <p:par>
-        <p:cTn id="1" dur="indefinite" restart="never" nodeType="tmRoot"/>
-      </p:par>
-    </p:tnLst>
-  </p:timing>
+  <p:transition spd="med">
+    <p:fade/>
+  </p:transition>
 </p:sld>
 </file>
 
@@ -12230,6 +12272,30 @@
           </a:graphicData>
         </a:graphic>
       </p:graphicFrame>
+      <p:sp>
+        <p:nvSpPr>
+          <p:cNvPr id="4" name="Slide Number Placeholder 3"/>
+          <p:cNvSpPr>
+            <a:spLocks noGrp="1"/>
+          </p:cNvSpPr>
+          <p:nvPr>
+            <p:ph type="sldNum" sz="quarter" idx="4"/>
+          </p:nvPr>
+        </p:nvSpPr>
+        <p:spPr/>
+        <p:txBody>
+          <a:bodyPr/>
+          <a:lstStyle/>
+          <a:p>
+            <a:fld id="{F2394529-A9B3-4A54-83EC-E61379E8334E}" type="slidenum">
+              <a:rPr lang="en-US" smtClean="0"/>
+              <a:pPr/>
+              <a:t>35</a:t>
+            </a:fld>
+            <a:endParaRPr lang="en-US" dirty="0"/>
+          </a:p>
+        </p:txBody>
+      </p:sp>
     </p:spTree>
   </p:cSld>
   <p:clrMapOvr>
@@ -12269,127 +12335,42 @@
             <a:spLocks noGrp="1"/>
           </p:cNvSpPr>
           <p:nvPr>
-            <p:ph type="title"/>
+            <p:ph type="ctrTitle"/>
           </p:nvPr>
         </p:nvSpPr>
         <p:spPr/>
         <p:txBody>
-          <a:bodyPr>
-            <a:normAutofit/>
-          </a:bodyPr>
+          <a:bodyPr/>
           <a:lstStyle/>
           <a:p>
             <a:r>
               <a:rPr lang="en-US" dirty="0" smtClean="0"/>
-              <a:t>Debug and Trace</a:t>
+              <a:t>Power Management</a:t>
             </a:r>
+            <a:endParaRPr lang="en-US" dirty="0"/>
           </a:p>
         </p:txBody>
       </p:sp>
       <p:sp>
         <p:nvSpPr>
-          <p:cNvPr id="3" name="Content Placeholder 2"/>
+          <p:cNvPr id="3" name="Subtitle 2"/>
           <p:cNvSpPr>
             <a:spLocks noGrp="1"/>
           </p:cNvSpPr>
           <p:nvPr>
-            <p:ph idx="1"/>
+            <p:ph type="subTitle" idx="1"/>
           </p:nvPr>
         </p:nvSpPr>
-        <p:spPr>
-          <a:noFill/>
-          <a:ln>
-            <a:noFill/>
-          </a:ln>
-        </p:spPr>
+        <p:spPr/>
         <p:txBody>
-          <a:bodyPr>
-            <a:normAutofit lnSpcReduction="10000"/>
-          </a:bodyPr>
+          <a:bodyPr/>
           <a:lstStyle/>
           <a:p>
             <a:r>
               <a:rPr lang="en-US" dirty="0" smtClean="0"/>
-              <a:t>C66x CorePac in KeyStone</a:t>
+              <a:t>C66x CorePac Overview</a:t>
             </a:r>
-          </a:p>
-          <a:p>
-            <a:r>
-              <a:rPr lang="en-US" dirty="0" smtClean="0"/>
-              <a:t>C66x CorePac Features</a:t>
-            </a:r>
-          </a:p>
-          <a:p>
-            <a:pPr marL="811213" lvl="1" indent="-514350" eaLnBrk="1" fontAlgn="auto" hangingPunct="1">
-              <a:spcAft>
-                <a:spcPts val="0"/>
-              </a:spcAft>
-              <a:defRPr/>
-            </a:pPr>
-            <a:r>
-              <a:rPr lang="en-US" dirty="0" smtClean="0"/>
-              <a:t>DSP Core Architecture</a:t>
-            </a:r>
-          </a:p>
-          <a:p>
-            <a:pPr marL="811213" lvl="1" indent="-514350" eaLnBrk="1" fontAlgn="auto" hangingPunct="1">
-              <a:spcAft>
-                <a:spcPts val="0"/>
-              </a:spcAft>
-              <a:defRPr/>
-            </a:pPr>
-            <a:r>
-              <a:rPr lang="en-US" dirty="0" smtClean="0"/>
-              <a:t>Single Instruction Multiple Data (SIMD)</a:t>
-            </a:r>
-          </a:p>
-          <a:p>
-            <a:pPr marL="811213" lvl="1" indent="-514350" eaLnBrk="1" fontAlgn="auto" hangingPunct="1">
-              <a:spcAft>
-                <a:spcPts val="0"/>
-              </a:spcAft>
-              <a:defRPr/>
-            </a:pPr>
-            <a:r>
-              <a:rPr lang="en-US" dirty="0" smtClean="0"/>
-              <a:t>Memory Access </a:t>
-            </a:r>
-          </a:p>
-          <a:p>
-            <a:pPr marL="811213" lvl="1" indent="-514350" eaLnBrk="1" fontAlgn="auto" hangingPunct="1">
-              <a:spcAft>
-                <a:spcPts val="0"/>
-              </a:spcAft>
-              <a:defRPr/>
-            </a:pPr>
-            <a:r>
-              <a:rPr lang="en-US" dirty="0" smtClean="0"/>
-              <a:t>Pipeline Support</a:t>
-            </a:r>
-          </a:p>
-          <a:p>
-            <a:r>
-              <a:rPr lang="en-US" dirty="0" smtClean="0"/>
-              <a:t>Interface to the SOC</a:t>
-            </a:r>
-          </a:p>
-          <a:p>
-            <a:r>
-              <a:rPr lang="en-US" dirty="0" smtClean="0"/>
-              <a:t>Interrupt Controller</a:t>
-            </a:r>
-          </a:p>
-          <a:p>
-            <a:r>
-              <a:rPr lang="en-US" dirty="0" smtClean="0"/>
-              <a:t>Power Management</a:t>
-            </a:r>
-          </a:p>
-          <a:p>
-            <a:r>
-              <a:rPr lang="en-US" b="1" dirty="0" smtClean="0"/>
-              <a:t>Debug and Trace</a:t>
-            </a:r>
+            <a:endParaRPr lang="en-US" dirty="0"/>
           </a:p>
         </p:txBody>
       </p:sp>
@@ -12398,13 +12379,9 @@
   <p:clrMapOvr>
     <a:masterClrMapping/>
   </p:clrMapOvr>
-  <p:timing>
-    <p:tnLst>
-      <p:par>
-        <p:cTn id="1" dur="indefinite" restart="never" nodeType="tmRoot"/>
-      </p:par>
-    </p:tnLst>
-  </p:timing>
+  <p:transition spd="med">
+    <p:fade/>
+  </p:transition>
 </p:sld>
 </file>
 
@@ -12636,6 +12613,30 @@
           </a:p>
         </p:txBody>
       </p:sp>
+      <p:sp>
+        <p:nvSpPr>
+          <p:cNvPr id="5" name="Slide Number Placeholder 4"/>
+          <p:cNvSpPr>
+            <a:spLocks noGrp="1"/>
+          </p:cNvSpPr>
+          <p:nvPr>
+            <p:ph type="sldNum" sz="quarter" idx="4"/>
+          </p:nvPr>
+        </p:nvSpPr>
+        <p:spPr/>
+        <p:txBody>
+          <a:bodyPr/>
+          <a:lstStyle/>
+          <a:p>
+            <a:fld id="{F2394529-A9B3-4A54-83EC-E61379E8334E}" type="slidenum">
+              <a:rPr lang="en-US" smtClean="0"/>
+              <a:pPr/>
+              <a:t>37</a:t>
+            </a:fld>
+            <a:endParaRPr lang="en-US" dirty="0"/>
+          </a:p>
+        </p:txBody>
+      </p:sp>
     </p:spTree>
     <p:custDataLst>
       <p:tags r:id="rId1"/>
@@ -12762,6 +12763,30 @@
           </a:p>
         </p:txBody>
       </p:sp>
+      <p:sp>
+        <p:nvSpPr>
+          <p:cNvPr id="4" name="Slide Number Placeholder 3"/>
+          <p:cNvSpPr>
+            <a:spLocks noGrp="1"/>
+          </p:cNvSpPr>
+          <p:nvPr>
+            <p:ph type="sldNum" sz="quarter" idx="4"/>
+          </p:nvPr>
+        </p:nvSpPr>
+        <p:spPr/>
+        <p:txBody>
+          <a:bodyPr/>
+          <a:lstStyle/>
+          <a:p>
+            <a:fld id="{F2394529-A9B3-4A54-83EC-E61379E8334E}" type="slidenum">
+              <a:rPr lang="en-US" smtClean="0"/>
+              <a:pPr/>
+              <a:t>38</a:t>
+            </a:fld>
+            <a:endParaRPr lang="en-US" dirty="0"/>
+          </a:p>
+        </p:txBody>
+      </p:sp>
     </p:spTree>
     <p:custDataLst>
       <p:tags r:id="rId1"/>
@@ -12837,7 +12862,7 @@
         </p:nvSpPr>
         <p:spPr>
           <a:xfrm>
-            <a:off x="5459407" y="930806"/>
+            <a:off x="5459407" y="856466"/>
             <a:ext cx="3527425" cy="5546194"/>
           </a:xfrm>
         </p:spPr>
@@ -13051,7 +13076,7 @@
         </p:nvGrpSpPr>
         <p:grpSpPr>
           <a:xfrm>
-            <a:off x="0" y="914400"/>
+            <a:off x="0" y="840060"/>
             <a:ext cx="5360248" cy="5442739"/>
             <a:chOff x="0" y="914400"/>
             <a:chExt cx="5360248" cy="5442739"/>
@@ -33223,6 +33248,30 @@
           </p:txBody>
         </p:sp>
       </p:grpSp>
+      <p:sp>
+        <p:nvSpPr>
+          <p:cNvPr id="326" name="Slide Number Placeholder 325"/>
+          <p:cNvSpPr>
+            <a:spLocks noGrp="1"/>
+          </p:cNvSpPr>
+          <p:nvPr>
+            <p:ph type="sldNum" sz="quarter" idx="4"/>
+          </p:nvPr>
+        </p:nvSpPr>
+        <p:spPr/>
+        <p:txBody>
+          <a:bodyPr/>
+          <a:lstStyle/>
+          <a:p>
+            <a:fld id="{F2394529-A9B3-4A54-83EC-E61379E8334E}" type="slidenum">
+              <a:rPr lang="en-US" smtClean="0"/>
+              <a:pPr/>
+              <a:t>4</a:t>
+            </a:fld>
+            <a:endParaRPr lang="en-US" dirty="0"/>
+          </a:p>
+        </p:txBody>
+      </p:sp>
     </p:spTree>
     <p:custDataLst>
       <p:tags r:id="rId1"/>
@@ -33266,8 +33315,8 @@
         </p:nvSpPr>
         <p:spPr>
           <a:xfrm>
-            <a:off x="228600" y="6460272"/>
-            <a:ext cx="8763000" cy="369332"/>
+            <a:off x="0" y="6309732"/>
+            <a:ext cx="8991600" cy="505004"/>
           </a:xfrm>
           <a:prstGeom prst="rect">
             <a:avLst/>
@@ -33278,7 +33327,7 @@
         </p:spPr>
         <p:txBody>
           <a:bodyPr wrap="square" rtlCol="0">
-            <a:spAutoFit/>
+            <a:noAutofit/>
           </a:bodyPr>
           <a:lstStyle/>
           <a:p>
@@ -35594,6 +35643,30 @@
           </a:p>
         </p:txBody>
       </p:sp>
+      <p:sp>
+        <p:nvSpPr>
+          <p:cNvPr id="48" name="Slide Number Placeholder 47"/>
+          <p:cNvSpPr>
+            <a:spLocks noGrp="1"/>
+          </p:cNvSpPr>
+          <p:nvPr>
+            <p:ph type="sldNum" sz="quarter" idx="4"/>
+          </p:nvPr>
+        </p:nvSpPr>
+        <p:spPr/>
+        <p:txBody>
+          <a:bodyPr/>
+          <a:lstStyle/>
+          <a:p>
+            <a:fld id="{F2394529-A9B3-4A54-83EC-E61379E8334E}" type="slidenum">
+              <a:rPr lang="en-US" smtClean="0"/>
+              <a:pPr/>
+              <a:t>5</a:t>
+            </a:fld>
+            <a:endParaRPr lang="en-US" dirty="0"/>
+          </a:p>
+        </p:txBody>
+      </p:sp>
     </p:spTree>
     <p:custDataLst>
       <p:tags r:id="rId1"/>
@@ -35637,127 +35710,42 @@
             <a:spLocks noGrp="1"/>
           </p:cNvSpPr>
           <p:nvPr>
-            <p:ph type="title"/>
+            <p:ph type="ctrTitle"/>
           </p:nvPr>
         </p:nvSpPr>
         <p:spPr/>
         <p:txBody>
-          <a:bodyPr>
-            <a:normAutofit/>
-          </a:bodyPr>
+          <a:bodyPr/>
           <a:lstStyle/>
           <a:p>
             <a:r>
-              <a:rPr lang="en-US" sz="4000" dirty="0" smtClean="0"/>
+              <a:rPr lang="en-US" dirty="0" smtClean="0"/>
               <a:t>C66x CorePac Features: DSP Core</a:t>
             </a:r>
+            <a:endParaRPr lang="en-US" dirty="0"/>
           </a:p>
         </p:txBody>
       </p:sp>
       <p:sp>
         <p:nvSpPr>
-          <p:cNvPr id="3" name="Content Placeholder 2"/>
+          <p:cNvPr id="3" name="Subtitle 2"/>
           <p:cNvSpPr>
             <a:spLocks noGrp="1"/>
           </p:cNvSpPr>
           <p:nvPr>
-            <p:ph idx="1"/>
+            <p:ph type="subTitle" idx="1"/>
           </p:nvPr>
         </p:nvSpPr>
-        <p:spPr>
-          <a:noFill/>
-          <a:ln>
-            <a:noFill/>
-          </a:ln>
-        </p:spPr>
+        <p:spPr/>
         <p:txBody>
-          <a:bodyPr>
-            <a:normAutofit lnSpcReduction="10000"/>
-          </a:bodyPr>
+          <a:bodyPr/>
           <a:lstStyle/>
           <a:p>
             <a:r>
               <a:rPr lang="en-US" dirty="0" smtClean="0"/>
-              <a:t>C66x CorePac in KeyStone</a:t>
+              <a:t>C66x CorePac Overview</a:t>
             </a:r>
-          </a:p>
-          <a:p>
-            <a:r>
-              <a:rPr lang="en-US" b="1" dirty="0" smtClean="0"/>
-              <a:t>C66x CorePac Features</a:t>
-            </a:r>
-          </a:p>
-          <a:p>
-            <a:pPr marL="811213" lvl="1" indent="-514350" eaLnBrk="1" fontAlgn="auto" hangingPunct="1">
-              <a:spcAft>
-                <a:spcPts val="0"/>
-              </a:spcAft>
-              <a:defRPr/>
-            </a:pPr>
-            <a:r>
-              <a:rPr lang="en-US" b="1" dirty="0" smtClean="0"/>
-              <a:t>DSP Core Architecture</a:t>
-            </a:r>
-          </a:p>
-          <a:p>
-            <a:pPr marL="811213" lvl="1" indent="-514350" eaLnBrk="1" fontAlgn="auto" hangingPunct="1">
-              <a:spcAft>
-                <a:spcPts val="0"/>
-              </a:spcAft>
-              <a:defRPr/>
-            </a:pPr>
-            <a:r>
-              <a:rPr lang="en-US" dirty="0" smtClean="0"/>
-              <a:t>Single Instruction Multiple Data (SIMD)</a:t>
-            </a:r>
-          </a:p>
-          <a:p>
-            <a:pPr marL="811213" lvl="1" indent="-514350" eaLnBrk="1" fontAlgn="auto" hangingPunct="1">
-              <a:spcAft>
-                <a:spcPts val="0"/>
-              </a:spcAft>
-              <a:defRPr/>
-            </a:pPr>
-            <a:r>
-              <a:rPr lang="en-US" dirty="0" smtClean="0"/>
-              <a:t>Memory Access </a:t>
-            </a:r>
-          </a:p>
-          <a:p>
-            <a:pPr marL="811213" lvl="1" indent="-514350" eaLnBrk="1" fontAlgn="auto" hangingPunct="1">
-              <a:spcAft>
-                <a:spcPts val="0"/>
-              </a:spcAft>
-              <a:defRPr/>
-            </a:pPr>
-            <a:r>
-              <a:rPr lang="en-US" dirty="0" smtClean="0"/>
-              <a:t>Pipeline Concept</a:t>
-            </a:r>
-          </a:p>
-          <a:p>
-            <a:r>
-              <a:rPr lang="en-US" dirty="0" smtClean="0"/>
-              <a:t>Interface to the SOC</a:t>
-            </a:r>
-          </a:p>
-          <a:p>
-            <a:r>
-              <a:rPr lang="en-US" dirty="0" smtClean="0"/>
-              <a:t>Interrupt Controller</a:t>
-            </a:r>
-          </a:p>
-          <a:p>
-            <a:r>
-              <a:rPr lang="en-US" dirty="0" smtClean="0"/>
-              <a:t>Power Management</a:t>
-            </a:r>
-          </a:p>
-          <a:p>
-            <a:r>
-              <a:rPr lang="en-US" dirty="0" smtClean="0"/>
-              <a:t>Debug and Trace</a:t>
-            </a:r>
+            <a:endParaRPr lang="en-US" dirty="0"/>
           </a:p>
         </p:txBody>
       </p:sp>
@@ -35766,13 +35754,9 @@
   <p:clrMapOvr>
     <a:masterClrMapping/>
   </p:clrMapOvr>
-  <p:timing>
-    <p:tnLst>
-      <p:par>
-        <p:cTn id="1" dur="indefinite" restart="never" nodeType="tmRoot"/>
-      </p:par>
-    </p:tnLst>
-  </p:timing>
+  <p:transition spd="med">
+    <p:fade/>
+  </p:transition>
 </p:sld>
 </file>
 
@@ -38102,6 +38086,30 @@
           </a:p>
           <a:p>
             <a:endParaRPr lang="en-US" sz="2800" dirty="0" smtClean="0"/>
+          </a:p>
+        </p:txBody>
+      </p:sp>
+      <p:sp>
+        <p:nvSpPr>
+          <p:cNvPr id="59" name="Slide Number Placeholder 58"/>
+          <p:cNvSpPr>
+            <a:spLocks noGrp="1"/>
+          </p:cNvSpPr>
+          <p:nvPr>
+            <p:ph type="sldNum" sz="quarter" idx="4"/>
+          </p:nvPr>
+        </p:nvSpPr>
+        <p:spPr/>
+        <p:txBody>
+          <a:bodyPr/>
+          <a:lstStyle/>
+          <a:p>
+            <a:fld id="{F2394529-A9B3-4A54-83EC-E61379E8334E}" type="slidenum">
+              <a:rPr lang="en-US" smtClean="0"/>
+              <a:pPr/>
+              <a:t>7</a:t>
+            </a:fld>
+            <a:endParaRPr lang="en-US" dirty="0"/>
           </a:p>
         </p:txBody>
       </p:sp>
@@ -40599,6 +40607,30 @@
           </a:p>
         </p:txBody>
       </p:sp>
+      <p:sp>
+        <p:nvSpPr>
+          <p:cNvPr id="56" name="Slide Number Placeholder 55"/>
+          <p:cNvSpPr>
+            <a:spLocks noGrp="1"/>
+          </p:cNvSpPr>
+          <p:nvPr>
+            <p:ph type="sldNum" sz="quarter" idx="4"/>
+          </p:nvPr>
+        </p:nvSpPr>
+        <p:spPr/>
+        <p:txBody>
+          <a:bodyPr/>
+          <a:lstStyle/>
+          <a:p>
+            <a:fld id="{F2394529-A9B3-4A54-83EC-E61379E8334E}" type="slidenum">
+              <a:rPr lang="en-US" smtClean="0"/>
+              <a:pPr/>
+              <a:t>8</a:t>
+            </a:fld>
+            <a:endParaRPr lang="en-US" dirty="0"/>
+          </a:p>
+        </p:txBody>
+      </p:sp>
     </p:spTree>
     <p:custDataLst>
       <p:tags r:id="rId1"/>
@@ -40944,14 +40976,14 @@
       </p:grpSpPr>
       <p:sp>
         <p:nvSpPr>
-          <p:cNvPr id="6" name="TextBox 5"/>
+          <p:cNvPr id="7" name="TextBox 6"/>
           <p:cNvSpPr txBox="1"/>
           <p:nvPr/>
         </p:nvSpPr>
         <p:spPr>
           <a:xfrm>
-            <a:off x="228600" y="6460272"/>
-            <a:ext cx="8763000" cy="369332"/>
+            <a:off x="0" y="6309732"/>
+            <a:ext cx="8991600" cy="505004"/>
           </a:xfrm>
           <a:prstGeom prst="rect">
             <a:avLst/>
@@ -40962,7 +40994,7 @@
         </p:spPr>
         <p:txBody>
           <a:bodyPr wrap="square" rtlCol="0">
-            <a:spAutoFit/>
+            <a:noAutofit/>
           </a:bodyPr>
           <a:lstStyle/>
           <a:p>
@@ -41030,6 +41062,30 @@
           </a:prstGeom>
         </p:spPr>
       </p:pic>
+      <p:sp>
+        <p:nvSpPr>
+          <p:cNvPr id="8" name="Slide Number Placeholder 7"/>
+          <p:cNvSpPr>
+            <a:spLocks noGrp="1"/>
+          </p:cNvSpPr>
+          <p:nvPr>
+            <p:ph type="sldNum" sz="quarter" idx="4"/>
+          </p:nvPr>
+        </p:nvSpPr>
+        <p:spPr/>
+        <p:txBody>
+          <a:bodyPr/>
+          <a:lstStyle/>
+          <a:p>
+            <a:fld id="{F2394529-A9B3-4A54-83EC-E61379E8334E}" type="slidenum">
+              <a:rPr lang="en-US" smtClean="0"/>
+              <a:pPr/>
+              <a:t>9</a:t>
+            </a:fld>
+            <a:endParaRPr lang="en-US" dirty="0"/>
+          </a:p>
+        </p:txBody>
+      </p:sp>
     </p:spTree>
     <p:custDataLst>
       <p:tags r:id="rId1"/>
@@ -41063,18 +41119,6 @@
 
 <file path=ppt/tags/tag10.xml><?xml version="1.0" encoding="utf-8"?>
 <p:tagLst xmlns:a="http://schemas.openxmlformats.org/drawingml/2006/main" xmlns:r="http://schemas.openxmlformats.org/officeDocument/2006/relationships" xmlns:p="http://schemas.openxmlformats.org/presentationml/2006/main">
-  <p:tag name="ARTICULATE_PUBLISH_MODE" val="1"/>
-</p:tagLst>
-</file>
-
-<file path=ppt/tags/tag11.xml><?xml version="1.0" encoding="utf-8"?>
-<p:tagLst xmlns:a="http://schemas.openxmlformats.org/drawingml/2006/main" xmlns:r="http://schemas.openxmlformats.org/officeDocument/2006/relationships" xmlns:p="http://schemas.openxmlformats.org/presentationml/2006/main">
-  <p:tag name="ARTICULATE_PUBLISH_MODE" val="2"/>
-</p:tagLst>
-</file>
-
-<file path=ppt/tags/tag12.xml><?xml version="1.0" encoding="utf-8"?>
-<p:tagLst xmlns:a="http://schemas.openxmlformats.org/drawingml/2006/main" xmlns:r="http://schemas.openxmlformats.org/officeDocument/2006/relationships" xmlns:p="http://schemas.openxmlformats.org/presentationml/2006/main">
   <p:tag name="NO LOGOS" val="true"/>
   <p:tag name="COLORSCHEMEINDEX" val="6"/>
   <p:tag name="ELAPSEDTIME" val="119.848"/>
@@ -41086,7 +41130,7 @@
 </p:tagLst>
 </file>
 
-<file path=ppt/tags/tag13.xml><?xml version="1.0" encoding="utf-8"?>
+<file path=ppt/tags/tag11.xml><?xml version="1.0" encoding="utf-8"?>
 <p:tagLst xmlns:a="http://schemas.openxmlformats.org/drawingml/2006/main" xmlns:r="http://schemas.openxmlformats.org/officeDocument/2006/relationships" xmlns:p="http://schemas.openxmlformats.org/presentationml/2006/main">
   <p:tag name="ELAPSEDTIME" val="88.994"/>
   <p:tag name="ARTICULATE_SLIDE_GUID" val="643f2483-42f1-4978-b8b0-97afb08d078a"/>
@@ -41099,19 +41143,19 @@
 </p:tagLst>
 </file>
 
-<file path=ppt/tags/tag14.xml><?xml version="1.0" encoding="utf-8"?>
+<file path=ppt/tags/tag12.xml><?xml version="1.0" encoding="utf-8"?>
 <p:tagLst xmlns:a="http://schemas.openxmlformats.org/drawingml/2006/main" xmlns:r="http://schemas.openxmlformats.org/officeDocument/2006/relationships" xmlns:p="http://schemas.openxmlformats.org/presentationml/2006/main">
   <p:tag name="ARTICULATE_PUBLISH_MODE" val="2"/>
 </p:tagLst>
 </file>
 
-<file path=ppt/tags/tag15.xml><?xml version="1.0" encoding="utf-8"?>
+<file path=ppt/tags/tag13.xml><?xml version="1.0" encoding="utf-8"?>
 <p:tagLst xmlns:a="http://schemas.openxmlformats.org/drawingml/2006/main" xmlns:r="http://schemas.openxmlformats.org/officeDocument/2006/relationships" xmlns:p="http://schemas.openxmlformats.org/presentationml/2006/main">
   <p:tag name="ARTICULATE_PUBLISH_MODE" val="2"/>
 </p:tagLst>
 </file>
 
-<file path=ppt/tags/tag16.xml><?xml version="1.0" encoding="utf-8"?>
+<file path=ppt/tags/tag14.xml><?xml version="1.0" encoding="utf-8"?>
 <p:tagLst xmlns:a="http://schemas.openxmlformats.org/drawingml/2006/main" xmlns:r="http://schemas.openxmlformats.org/officeDocument/2006/relationships" xmlns:p="http://schemas.openxmlformats.org/presentationml/2006/main">
   <p:tag name="ELAPSEDTIME" val="70.552"/>
   <p:tag name="ARTICULATE_SLIDE_PAUSE" val="0"/>
@@ -41121,14 +41165,14 @@
 </p:tagLst>
 </file>
 
-<file path=ppt/tags/tag17.xml><?xml version="1.0" encoding="utf-8"?>
+<file path=ppt/tags/tag15.xml><?xml version="1.0" encoding="utf-8"?>
 <p:tagLst xmlns:a="http://schemas.openxmlformats.org/drawingml/2006/main" xmlns:r="http://schemas.openxmlformats.org/officeDocument/2006/relationships" xmlns:p="http://schemas.openxmlformats.org/presentationml/2006/main">
   <p:tag name="ARTICULATE_PUBLISH_MODE" val="2"/>
   <p:tag name="ARTICULATE_SOURCE_IMAGE" val="C:\Users\a0850458\AppData\Local\Temp\imgtemp\s4hGic1j_files\slide0001_image001.jpg"/>
 </p:tagLst>
 </file>
 
-<file path=ppt/tags/tag18.xml><?xml version="1.0" encoding="utf-8"?>
+<file path=ppt/tags/tag16.xml><?xml version="1.0" encoding="utf-8"?>
 <p:tagLst xmlns:a="http://schemas.openxmlformats.org/drawingml/2006/main" xmlns:r="http://schemas.openxmlformats.org/officeDocument/2006/relationships" xmlns:p="http://schemas.openxmlformats.org/presentationml/2006/main">
   <p:tag name="ELAPSEDTIME" val="36.463"/>
   <p:tag name="ARTICULATE_SLIDE_PAUSE" val="0"/>
@@ -41138,7 +41182,7 @@
 </p:tagLst>
 </file>
 
-<file path=ppt/tags/tag19.xml><?xml version="1.0" encoding="utf-8"?>
+<file path=ppt/tags/tag17.xml><?xml version="1.0" encoding="utf-8"?>
 <p:tagLst xmlns:a="http://schemas.openxmlformats.org/drawingml/2006/main" xmlns:r="http://schemas.openxmlformats.org/officeDocument/2006/relationships" xmlns:p="http://schemas.openxmlformats.org/presentationml/2006/main">
   <p:tag name="ELAPSEDTIME" val="22.776"/>
   <p:tag name="ARTICULATE_SLIDE_PAUSE" val="0"/>
@@ -41148,14 +41192,7 @@
 </p:tagLst>
 </file>
 
-<file path=ppt/tags/tag2.xml><?xml version="1.0" encoding="utf-8"?>
-<p:tagLst xmlns:a="http://schemas.openxmlformats.org/drawingml/2006/main" xmlns:r="http://schemas.openxmlformats.org/officeDocument/2006/relationships" xmlns:p="http://schemas.openxmlformats.org/presentationml/2006/main">
-  <p:tag name="ARTICULATE_PUBLISH_MODE" val="2"/>
-  <p:tag name="ARTICULATE_SOURCE_IMAGE" val="C:\DOCUME~1\a0850458\LOCALS~1\Temp\articulate\presenter\imgtemp\wmGCw7Yk_files\slide0001_image001.jpg"/>
-</p:tagLst>
-</file>
-
-<file path=ppt/tags/tag20.xml><?xml version="1.0" encoding="utf-8"?>
+<file path=ppt/tags/tag18.xml><?xml version="1.0" encoding="utf-8"?>
 <p:tagLst xmlns:a="http://schemas.openxmlformats.org/drawingml/2006/main" xmlns:r="http://schemas.openxmlformats.org/officeDocument/2006/relationships" xmlns:p="http://schemas.openxmlformats.org/presentationml/2006/main">
   <p:tag name="ELAPSEDTIME" val="38.656"/>
   <p:tag name="ARTICULATE_SLIDE_PAUSE" val="0"/>
@@ -41165,7 +41202,7 @@
 </p:tagLst>
 </file>
 
-<file path=ppt/tags/tag21.xml><?xml version="1.0" encoding="utf-8"?>
+<file path=ppt/tags/tag19.xml><?xml version="1.0" encoding="utf-8"?>
 <p:tagLst xmlns:a="http://schemas.openxmlformats.org/drawingml/2006/main" xmlns:r="http://schemas.openxmlformats.org/officeDocument/2006/relationships" xmlns:p="http://schemas.openxmlformats.org/presentationml/2006/main">
   <p:tag name="ELAPSEDTIME" val="172.406"/>
   <p:tag name="ARTICULATE_SLIDE_PAUSE" val="0"/>
@@ -41175,12 +41212,46 @@
 </p:tagLst>
 </file>
 
-<file path=ppt/tags/tag22.xml><?xml version="1.0" encoding="utf-8"?>
+<file path=ppt/tags/tag2.xml><?xml version="1.0" encoding="utf-8"?>
+<p:tagLst xmlns:a="http://schemas.openxmlformats.org/drawingml/2006/main" xmlns:r="http://schemas.openxmlformats.org/officeDocument/2006/relationships" xmlns:p="http://schemas.openxmlformats.org/presentationml/2006/main">
+  <p:tag name="ELAPSEDTIME" val="75.385"/>
+  <p:tag name="ARTICULATE_SLIDE_PAUSE" val="0"/>
+  <p:tag name="ARTICULATE_NAV_LEVEL" val="2"/>
+  <p:tag name="ARTICULATE_PLAYLIST_ID" val="-1"/>
+  <p:tag name="ARTICULATE_LOCK_SLIDE" val="0"/>
+  <p:tag name="ARTICULATE_SLIDE_GUID" val="0b93dcc8-d2cf-47d6-ab77-8f0eb20ec0b5"/>
+  <p:tag name="ARTICULATE_SLIDE_NAV" val="10"/>
+</p:tagLst>
+</file>
+
+<file path=ppt/tags/tag20.xml><?xml version="1.0" encoding="utf-8"?>
 <p:tagLst xmlns:a="http://schemas.openxmlformats.org/drawingml/2006/main" xmlns:r="http://schemas.openxmlformats.org/officeDocument/2006/relationships" xmlns:p="http://schemas.openxmlformats.org/presentationml/2006/main">
   <p:tag name="ELAPSEDTIME" val="201.348"/>
   <p:tag name="ARTICULATE_SLIDE_PAUSE" val="0"/>
   <p:tag name="ARTICULATE_NAV_LEVEL" val="2"/>
   <p:tag name="ARTICULATE_PLAYLIST_ID" val="-1"/>
+  <p:tag name="ARTICULATE_LOCK_SLIDE" val="0"/>
+</p:tagLst>
+</file>
+
+<file path=ppt/tags/tag21.xml><?xml version="1.0" encoding="utf-8"?>
+<p:tagLst xmlns:a="http://schemas.openxmlformats.org/drawingml/2006/main" xmlns:r="http://schemas.openxmlformats.org/officeDocument/2006/relationships" xmlns:p="http://schemas.openxmlformats.org/presentationml/2006/main">
+  <p:tag name="ELAPSEDTIME" val="82.572"/>
+  <p:tag name="ARTICULATE_SLIDE_PAUSE" val="0"/>
+  <p:tag name="ARTICULATE_NAV_LEVEL" val="2"/>
+  <p:tag name="ARTICULATE_PLAYLIST_ID" val="-1"/>
+  <p:tag name="ARTICULATE_LOCK_SLIDE" val="0"/>
+</p:tagLst>
+</file>
+
+<file path=ppt/tags/tag22.xml><?xml version="1.0" encoding="utf-8"?>
+<p:tagLst xmlns:a="http://schemas.openxmlformats.org/drawingml/2006/main" xmlns:r="http://schemas.openxmlformats.org/officeDocument/2006/relationships" xmlns:p="http://schemas.openxmlformats.org/presentationml/2006/main">
+  <p:tag name="NO LOGOS" val="true"/>
+  <p:tag name="ELAPSEDTIME" val="92.13"/>
+  <p:tag name="ARTICULATE_SLIDE_PAUSE" val="0"/>
+  <p:tag name="ARTICULATE_NAV_LEVEL" val="2"/>
+  <p:tag name="ARTICULATE_PLAYLIST_ID" val="-1"/>
+  <p:tag name="ARTICULATE_VIEW_MODE" val="1"/>
   <p:tag name="ARTICULATE_LOCK_SLIDE" val="0"/>
 </p:tagLst>
 </file>
@@ -41197,18 +41268,6 @@
 
 <file path=ppt/tags/tag24.xml><?xml version="1.0" encoding="utf-8"?>
 <p:tagLst xmlns:a="http://schemas.openxmlformats.org/drawingml/2006/main" xmlns:r="http://schemas.openxmlformats.org/officeDocument/2006/relationships" xmlns:p="http://schemas.openxmlformats.org/presentationml/2006/main">
-  <p:tag name="NO LOGOS" val="true"/>
-  <p:tag name="ELAPSEDTIME" val="92.13"/>
-  <p:tag name="ARTICULATE_SLIDE_PAUSE" val="0"/>
-  <p:tag name="ARTICULATE_NAV_LEVEL" val="2"/>
-  <p:tag name="ARTICULATE_PLAYLIST_ID" val="-1"/>
-  <p:tag name="ARTICULATE_VIEW_MODE" val="1"/>
-  <p:tag name="ARTICULATE_LOCK_SLIDE" val="0"/>
-</p:tagLst>
-</file>
-
-<file path=ppt/tags/tag25.xml><?xml version="1.0" encoding="utf-8"?>
-<p:tagLst xmlns:a="http://schemas.openxmlformats.org/drawingml/2006/main" xmlns:r="http://schemas.openxmlformats.org/officeDocument/2006/relationships" xmlns:p="http://schemas.openxmlformats.org/presentationml/2006/main">
   <p:tag name="ELAPSEDTIME" val="82.572"/>
   <p:tag name="ARTICULATE_SLIDE_PAUSE" val="0"/>
   <p:tag name="ARTICULATE_NAV_LEVEL" val="2"/>
@@ -41217,17 +41276,7 @@
 </p:tagLst>
 </file>
 
-<file path=ppt/tags/tag26.xml><?xml version="1.0" encoding="utf-8"?>
-<p:tagLst xmlns:a="http://schemas.openxmlformats.org/drawingml/2006/main" xmlns:r="http://schemas.openxmlformats.org/officeDocument/2006/relationships" xmlns:p="http://schemas.openxmlformats.org/presentationml/2006/main">
-  <p:tag name="ELAPSEDTIME" val="82.572"/>
-  <p:tag name="ARTICULATE_SLIDE_PAUSE" val="0"/>
-  <p:tag name="ARTICULATE_NAV_LEVEL" val="2"/>
-  <p:tag name="ARTICULATE_PLAYLIST_ID" val="-1"/>
-  <p:tag name="ARTICULATE_LOCK_SLIDE" val="0"/>
-</p:tagLst>
-</file>
-
-<file path=ppt/tags/tag27.xml><?xml version="1.0" encoding="utf-8"?>
+<file path=ppt/tags/tag25.xml><?xml version="1.0" encoding="utf-8"?>
 <p:tagLst xmlns:a="http://schemas.openxmlformats.org/drawingml/2006/main" xmlns:r="http://schemas.openxmlformats.org/officeDocument/2006/relationships" xmlns:p="http://schemas.openxmlformats.org/presentationml/2006/main">
   <p:tag name="ELAPSEDTIME" val="2761.739"/>
   <p:tag name="ARTICULATE_SLIDE_PAUSE" val="0"/>
@@ -41238,25 +41287,6 @@
 </file>
 
 <file path=ppt/tags/tag3.xml><?xml version="1.0" encoding="utf-8"?>
-<p:tagLst xmlns:a="http://schemas.openxmlformats.org/drawingml/2006/main" xmlns:r="http://schemas.openxmlformats.org/officeDocument/2006/relationships" xmlns:p="http://schemas.openxmlformats.org/presentationml/2006/main">
-  <p:tag name="ARTICULATE_PUBLISH_MODE" val="2"/>
-  <p:tag name="ARTICULATE_SOURCE_IMAGE" val="C:\DOCUME~1\a0850458\LOCALS~1\Temp\articulate\presenter\imgtemp\1IW6HyKN_files\slide0001_image001.png"/>
-</p:tagLst>
-</file>
-
-<file path=ppt/tags/tag4.xml><?xml version="1.0" encoding="utf-8"?>
-<p:tagLst xmlns:a="http://schemas.openxmlformats.org/drawingml/2006/main" xmlns:r="http://schemas.openxmlformats.org/officeDocument/2006/relationships" xmlns:p="http://schemas.openxmlformats.org/presentationml/2006/main">
-  <p:tag name="ELAPSEDTIME" val="75.385"/>
-  <p:tag name="ARTICULATE_SLIDE_PAUSE" val="0"/>
-  <p:tag name="ARTICULATE_NAV_LEVEL" val="2"/>
-  <p:tag name="ARTICULATE_PLAYLIST_ID" val="-1"/>
-  <p:tag name="ARTICULATE_LOCK_SLIDE" val="0"/>
-  <p:tag name="ARTICULATE_SLIDE_GUID" val="0b93dcc8-d2cf-47d6-ab77-8f0eb20ec0b5"/>
-  <p:tag name="ARTICULATE_SLIDE_NAV" val="10"/>
-</p:tagLst>
-</file>
-
-<file path=ppt/tags/tag5.xml><?xml version="1.0" encoding="utf-8"?>
 <p:tagLst xmlns:a="http://schemas.openxmlformats.org/drawingml/2006/main" xmlns:r="http://schemas.openxmlformats.org/officeDocument/2006/relationships" xmlns:p="http://schemas.openxmlformats.org/presentationml/2006/main">
   <p:tag name="ELAPSEDTIME" val="122.588"/>
   <p:tag name="ARTICULATE_SLIDE_GUID" val="f63357b2-8a1b-4c55-9126-951da9cde8bb"/>
@@ -41269,6 +41299,18 @@
 </p:tagLst>
 </file>
 
+<file path=ppt/tags/tag4.xml><?xml version="1.0" encoding="utf-8"?>
+<p:tagLst xmlns:a="http://schemas.openxmlformats.org/drawingml/2006/main" xmlns:r="http://schemas.openxmlformats.org/officeDocument/2006/relationships" xmlns:p="http://schemas.openxmlformats.org/presentationml/2006/main">
+  <p:tag name="ARTICULATE_PUBLISH_MODE" val="1"/>
+</p:tagLst>
+</file>
+
+<file path=ppt/tags/tag5.xml><?xml version="1.0" encoding="utf-8"?>
+<p:tagLst xmlns:a="http://schemas.openxmlformats.org/drawingml/2006/main" xmlns:r="http://schemas.openxmlformats.org/officeDocument/2006/relationships" xmlns:p="http://schemas.openxmlformats.org/presentationml/2006/main">
+  <p:tag name="ARTICULATE_PUBLISH_MODE" val="1"/>
+</p:tagLst>
+</file>
+
 <file path=ppt/tags/tag6.xml><?xml version="1.0" encoding="utf-8"?>
 <p:tagLst xmlns:a="http://schemas.openxmlformats.org/drawingml/2006/main" xmlns:r="http://schemas.openxmlformats.org/officeDocument/2006/relationships" xmlns:p="http://schemas.openxmlformats.org/presentationml/2006/main">
   <p:tag name="ARTICULATE_PUBLISH_MODE" val="1"/>
@@ -41277,7 +41319,7 @@
 
 <file path=ppt/tags/tag7.xml><?xml version="1.0" encoding="utf-8"?>
 <p:tagLst xmlns:a="http://schemas.openxmlformats.org/drawingml/2006/main" xmlns:r="http://schemas.openxmlformats.org/officeDocument/2006/relationships" xmlns:p="http://schemas.openxmlformats.org/presentationml/2006/main">
-  <p:tag name="ARTICULATE_PUBLISH_MODE" val="1"/>
+  <p:tag name="ARTICULATE_PUBLISH_MODE" val="2"/>
 </p:tagLst>
 </file>
 

</xml_diff>